<commit_message>
update d las ppts
updates, to review
</commit_message>
<xml_diff>
--- a/Version/Documentación/MDVRP.pptx
+++ b/Version/Documentación/MDVRP.pptx
@@ -24,9 +24,10 @@
     <p:sldId id="276" r:id="rId18"/>
     <p:sldId id="266" r:id="rId19"/>
     <p:sldId id="267" r:id="rId20"/>
-    <p:sldId id="268" r:id="rId21"/>
-    <p:sldId id="269" r:id="rId22"/>
-    <p:sldId id="270" r:id="rId23"/>
+    <p:sldId id="281" r:id="rId21"/>
+    <p:sldId id="283" r:id="rId22"/>
+    <p:sldId id="269" r:id="rId23"/>
+    <p:sldId id="270" r:id="rId24"/>
   </p:sldIdLst>
   <p:sldSz cx="12192000" cy="6858000"/>
   <p:notesSz cx="6858000" cy="9144000"/>
@@ -125,6 +126,22 @@
       </a:defRPr>
     </a:lvl9pPr>
   </p:defaultTextStyle>
+  <p:extLst>
+    <p:ext uri="{EFAFB233-063F-42B5-8137-9DF3F51BA10A}">
+      <p15:sldGuideLst xmlns:p15="http://schemas.microsoft.com/office/powerpoint/2012/main">
+        <p15:guide id="1" orient="horz" pos="2160">
+          <p15:clr>
+            <a:srgbClr val="A4A3A4"/>
+          </p15:clr>
+        </p15:guide>
+        <p15:guide id="2" pos="3840">
+          <p15:clr>
+            <a:srgbClr val="A4A3A4"/>
+          </p15:clr>
+        </p15:guide>
+      </p15:sldGuideLst>
+    </p:ext>
+  </p:extLst>
 </p:presentation>
 </file>
 
@@ -259,7 +276,7 @@
           <a:p>
             <a:fld id="{12CBEF13-57F1-471C-ABF2-505306D08CB7}" type="datetimeFigureOut">
               <a:rPr lang="es-UY" smtClean="0"/>
-              <a:t>9/12/2015</a:t>
+              <a:t>11/12/2015</a:t>
             </a:fld>
             <a:endParaRPr lang="es-UY"/>
           </a:p>
@@ -301,7 +318,7 @@
           <a:p>
             <a:fld id="{D70CDD41-C5AA-403A-9E3F-13D09751A68A}" type="slidenum">
               <a:rPr lang="es-UY" smtClean="0"/>
-              <a:t>‹Nº›</a:t>
+              <a:t>‹#›</a:t>
             </a:fld>
             <a:endParaRPr lang="es-UY"/>
           </a:p>
@@ -429,7 +446,7 @@
           <a:p>
             <a:fld id="{12CBEF13-57F1-471C-ABF2-505306D08CB7}" type="datetimeFigureOut">
               <a:rPr lang="es-UY" smtClean="0"/>
-              <a:t>9/12/2015</a:t>
+              <a:t>11/12/2015</a:t>
             </a:fld>
             <a:endParaRPr lang="es-UY"/>
           </a:p>
@@ -471,7 +488,7 @@
           <a:p>
             <a:fld id="{D70CDD41-C5AA-403A-9E3F-13D09751A68A}" type="slidenum">
               <a:rPr lang="es-UY" smtClean="0"/>
-              <a:t>‹Nº›</a:t>
+              <a:t>‹#›</a:t>
             </a:fld>
             <a:endParaRPr lang="es-UY"/>
           </a:p>
@@ -609,7 +626,7 @@
           <a:p>
             <a:fld id="{12CBEF13-57F1-471C-ABF2-505306D08CB7}" type="datetimeFigureOut">
               <a:rPr lang="es-UY" smtClean="0"/>
-              <a:t>9/12/2015</a:t>
+              <a:t>11/12/2015</a:t>
             </a:fld>
             <a:endParaRPr lang="es-UY"/>
           </a:p>
@@ -651,7 +668,7 @@
           <a:p>
             <a:fld id="{D70CDD41-C5AA-403A-9E3F-13D09751A68A}" type="slidenum">
               <a:rPr lang="es-UY" smtClean="0"/>
-              <a:t>‹Nº›</a:t>
+              <a:t>‹#›</a:t>
             </a:fld>
             <a:endParaRPr lang="es-UY"/>
           </a:p>
@@ -779,7 +796,7 @@
           <a:p>
             <a:fld id="{12CBEF13-57F1-471C-ABF2-505306D08CB7}" type="datetimeFigureOut">
               <a:rPr lang="es-UY" smtClean="0"/>
-              <a:t>9/12/2015</a:t>
+              <a:t>11/12/2015</a:t>
             </a:fld>
             <a:endParaRPr lang="es-UY"/>
           </a:p>
@@ -821,7 +838,7 @@
           <a:p>
             <a:fld id="{D70CDD41-C5AA-403A-9E3F-13D09751A68A}" type="slidenum">
               <a:rPr lang="es-UY" smtClean="0"/>
-              <a:t>‹Nº›</a:t>
+              <a:t>‹#›</a:t>
             </a:fld>
             <a:endParaRPr lang="es-UY"/>
           </a:p>
@@ -1025,7 +1042,7 @@
           <a:p>
             <a:fld id="{12CBEF13-57F1-471C-ABF2-505306D08CB7}" type="datetimeFigureOut">
               <a:rPr lang="es-UY" smtClean="0"/>
-              <a:t>9/12/2015</a:t>
+              <a:t>11/12/2015</a:t>
             </a:fld>
             <a:endParaRPr lang="es-UY"/>
           </a:p>
@@ -1067,7 +1084,7 @@
           <a:p>
             <a:fld id="{D70CDD41-C5AA-403A-9E3F-13D09751A68A}" type="slidenum">
               <a:rPr lang="es-UY" smtClean="0"/>
-              <a:t>‹Nº›</a:t>
+              <a:t>‹#›</a:t>
             </a:fld>
             <a:endParaRPr lang="es-UY"/>
           </a:p>
@@ -1257,7 +1274,7 @@
           <a:p>
             <a:fld id="{12CBEF13-57F1-471C-ABF2-505306D08CB7}" type="datetimeFigureOut">
               <a:rPr lang="es-UY" smtClean="0"/>
-              <a:t>9/12/2015</a:t>
+              <a:t>11/12/2015</a:t>
             </a:fld>
             <a:endParaRPr lang="es-UY"/>
           </a:p>
@@ -1299,7 +1316,7 @@
           <a:p>
             <a:fld id="{D70CDD41-C5AA-403A-9E3F-13D09751A68A}" type="slidenum">
               <a:rPr lang="es-UY" smtClean="0"/>
-              <a:t>‹Nº›</a:t>
+              <a:t>‹#›</a:t>
             </a:fld>
             <a:endParaRPr lang="es-UY"/>
           </a:p>
@@ -1624,7 +1641,7 @@
           <a:p>
             <a:fld id="{12CBEF13-57F1-471C-ABF2-505306D08CB7}" type="datetimeFigureOut">
               <a:rPr lang="es-UY" smtClean="0"/>
-              <a:t>9/12/2015</a:t>
+              <a:t>11/12/2015</a:t>
             </a:fld>
             <a:endParaRPr lang="es-UY"/>
           </a:p>
@@ -1666,7 +1683,7 @@
           <a:p>
             <a:fld id="{D70CDD41-C5AA-403A-9E3F-13D09751A68A}" type="slidenum">
               <a:rPr lang="es-UY" smtClean="0"/>
-              <a:t>‹Nº›</a:t>
+              <a:t>‹#›</a:t>
             </a:fld>
             <a:endParaRPr lang="es-UY"/>
           </a:p>
@@ -1742,7 +1759,7 @@
           <a:p>
             <a:fld id="{12CBEF13-57F1-471C-ABF2-505306D08CB7}" type="datetimeFigureOut">
               <a:rPr lang="es-UY" smtClean="0"/>
-              <a:t>9/12/2015</a:t>
+              <a:t>11/12/2015</a:t>
             </a:fld>
             <a:endParaRPr lang="es-UY"/>
           </a:p>
@@ -1784,7 +1801,7 @@
           <a:p>
             <a:fld id="{D70CDD41-C5AA-403A-9E3F-13D09751A68A}" type="slidenum">
               <a:rPr lang="es-UY" smtClean="0"/>
-              <a:t>‹Nº›</a:t>
+              <a:t>‹#›</a:t>
             </a:fld>
             <a:endParaRPr lang="es-UY"/>
           </a:p>
@@ -1837,7 +1854,7 @@
           <a:p>
             <a:fld id="{12CBEF13-57F1-471C-ABF2-505306D08CB7}" type="datetimeFigureOut">
               <a:rPr lang="es-UY" smtClean="0"/>
-              <a:t>9/12/2015</a:t>
+              <a:t>11/12/2015</a:t>
             </a:fld>
             <a:endParaRPr lang="es-UY"/>
           </a:p>
@@ -1879,7 +1896,7 @@
           <a:p>
             <a:fld id="{D70CDD41-C5AA-403A-9E3F-13D09751A68A}" type="slidenum">
               <a:rPr lang="es-UY" smtClean="0"/>
-              <a:t>‹Nº›</a:t>
+              <a:t>‹#›</a:t>
             </a:fld>
             <a:endParaRPr lang="es-UY"/>
           </a:p>
@@ -2114,7 +2131,7 @@
           <a:p>
             <a:fld id="{12CBEF13-57F1-471C-ABF2-505306D08CB7}" type="datetimeFigureOut">
               <a:rPr lang="es-UY" smtClean="0"/>
-              <a:t>9/12/2015</a:t>
+              <a:t>11/12/2015</a:t>
             </a:fld>
             <a:endParaRPr lang="es-UY"/>
           </a:p>
@@ -2156,7 +2173,7 @@
           <a:p>
             <a:fld id="{D70CDD41-C5AA-403A-9E3F-13D09751A68A}" type="slidenum">
               <a:rPr lang="es-UY" smtClean="0"/>
-              <a:t>‹Nº›</a:t>
+              <a:t>‹#›</a:t>
             </a:fld>
             <a:endParaRPr lang="es-UY"/>
           </a:p>
@@ -2367,7 +2384,7 @@
           <a:p>
             <a:fld id="{12CBEF13-57F1-471C-ABF2-505306D08CB7}" type="datetimeFigureOut">
               <a:rPr lang="es-UY" smtClean="0"/>
-              <a:t>9/12/2015</a:t>
+              <a:t>11/12/2015</a:t>
             </a:fld>
             <a:endParaRPr lang="es-UY"/>
           </a:p>
@@ -2409,7 +2426,7 @@
           <a:p>
             <a:fld id="{D70CDD41-C5AA-403A-9E3F-13D09751A68A}" type="slidenum">
               <a:rPr lang="es-UY" smtClean="0"/>
-              <a:t>‹Nº›</a:t>
+              <a:t>‹#›</a:t>
             </a:fld>
             <a:endParaRPr lang="es-UY"/>
           </a:p>
@@ -2580,7 +2597,7 @@
           <a:p>
             <a:fld id="{12CBEF13-57F1-471C-ABF2-505306D08CB7}" type="datetimeFigureOut">
               <a:rPr lang="es-UY" smtClean="0"/>
-              <a:t>9/12/2015</a:t>
+              <a:t>11/12/2015</a:t>
             </a:fld>
             <a:endParaRPr lang="es-UY"/>
           </a:p>
@@ -2658,7 +2675,7 @@
           <a:p>
             <a:fld id="{D70CDD41-C5AA-403A-9E3F-13D09751A68A}" type="slidenum">
               <a:rPr lang="es-UY" smtClean="0"/>
-              <a:t>‹Nº›</a:t>
+              <a:t>‹#›</a:t>
             </a:fld>
             <a:endParaRPr lang="es-UY"/>
           </a:p>
@@ -3024,8 +3041,8 @@
           <a:lstStyle/>
           <a:p>
             <a:r>
-              <a:rPr lang="en-US" dirty="0" err="1" smtClean="0"/>
-              <a:t>Introduccion</a:t>
+              <a:rPr lang="es-UY" dirty="0" smtClean="0"/>
+              <a:t>Introducción</a:t>
             </a:r>
             <a:endParaRPr lang="es-UY" dirty="0"/>
           </a:p>
@@ -3587,7 +3604,7 @@
                       <m:sSubPr>
                         <m:ctrlPr>
                           <a:rPr lang="es-UY" i="1">
-                            <a:latin typeface="Cambria Math"/>
+                            <a:latin typeface="Cambria Math" panose="02040503050406030204" pitchFamily="18" charset="0"/>
                           </a:rPr>
                         </m:ctrlPr>
                       </m:sSubPr>
@@ -3624,7 +3641,7 @@
                       <m:sSubPr>
                         <m:ctrlPr>
                           <a:rPr lang="es-UY" i="1">
-                            <a:latin typeface="Cambria Math"/>
+                            <a:latin typeface="Cambria Math" panose="02040503050406030204" pitchFamily="18" charset="0"/>
                           </a:rPr>
                         </m:ctrlPr>
                       </m:sSubPr>
@@ -3655,7 +3672,7 @@
                       <m:sSubPr>
                         <m:ctrlPr>
                           <a:rPr lang="es-UY" i="1">
-                            <a:latin typeface="Cambria Math"/>
+                            <a:latin typeface="Cambria Math" panose="02040503050406030204" pitchFamily="18" charset="0"/>
                           </a:rPr>
                         </m:ctrlPr>
                       </m:sSubPr>
@@ -3686,7 +3703,7 @@
                       <m:sSubPr>
                         <m:ctrlPr>
                           <a:rPr lang="es-UY" i="1">
-                            <a:latin typeface="Cambria Math"/>
+                            <a:latin typeface="Cambria Math" panose="02040503050406030204" pitchFamily="18" charset="0"/>
                           </a:rPr>
                         </m:ctrlPr>
                       </m:sSubPr>
@@ -3753,7 +3770,7 @@
                       <m:sSubPr>
                         <m:ctrlPr>
                           <a:rPr lang="es-UY" i="1">
-                            <a:latin typeface="Cambria Math"/>
+                            <a:latin typeface="Cambria Math" panose="02040503050406030204" pitchFamily="18" charset="0"/>
                           </a:rPr>
                         </m:ctrlPr>
                       </m:sSubPr>
@@ -3796,7 +3813,7 @@
                       <m:sSubPr>
                         <m:ctrlPr>
                           <a:rPr lang="es-UY" i="1">
-                            <a:latin typeface="Cambria Math"/>
+                            <a:latin typeface="Cambria Math" panose="02040503050406030204" pitchFamily="18" charset="0"/>
                           </a:rPr>
                         </m:ctrlPr>
                       </m:sSubPr>
@@ -3835,7 +3852,7 @@
                       <m:sSubPr>
                         <m:ctrlPr>
                           <a:rPr lang="es-UY" i="1">
-                            <a:latin typeface="Cambria Math"/>
+                            <a:latin typeface="Cambria Math" panose="02040503050406030204" pitchFamily="18" charset="0"/>
                           </a:rPr>
                         </m:ctrlPr>
                       </m:sSubPr>
@@ -3878,7 +3895,7 @@
                       <m:sSubPr>
                         <m:ctrlPr>
                           <a:rPr lang="es-UY" i="1">
-                            <a:latin typeface="Cambria Math"/>
+                            <a:latin typeface="Cambria Math" panose="02040503050406030204" pitchFamily="18" charset="0"/>
                           </a:rPr>
                         </m:ctrlPr>
                       </m:sSubPr>
@@ -3921,7 +3938,7 @@
                       <m:sSubPr>
                         <m:ctrlPr>
                           <a:rPr lang="es-UY" i="1">
-                            <a:latin typeface="Cambria Math"/>
+                            <a:latin typeface="Cambria Math" panose="02040503050406030204" pitchFamily="18" charset="0"/>
                           </a:rPr>
                         </m:ctrlPr>
                       </m:sSubPr>
@@ -3960,7 +3977,7 @@
                       <m:sSubPr>
                         <m:ctrlPr>
                           <a:rPr lang="es-UY" i="1">
-                            <a:latin typeface="Cambria Math"/>
+                            <a:latin typeface="Cambria Math" panose="02040503050406030204" pitchFamily="18" charset="0"/>
                           </a:rPr>
                         </m:ctrlPr>
                       </m:sSubPr>
@@ -4003,7 +4020,7 @@
                       <m:sSubPr>
                         <m:ctrlPr>
                           <a:rPr lang="es-UY" i="1">
-                            <a:latin typeface="Cambria Math"/>
+                            <a:latin typeface="Cambria Math" panose="02040503050406030204" pitchFamily="18" charset="0"/>
                           </a:rPr>
                         </m:ctrlPr>
                       </m:sSubPr>
@@ -4042,7 +4059,7 @@
                       <m:sSubPr>
                         <m:ctrlPr>
                           <a:rPr lang="es-UY" i="1">
-                            <a:latin typeface="Cambria Math"/>
+                            <a:latin typeface="Cambria Math" panose="02040503050406030204" pitchFamily="18" charset="0"/>
                           </a:rPr>
                         </m:ctrlPr>
                       </m:sSubPr>
@@ -4085,7 +4102,7 @@
                       <m:sSubPr>
                         <m:ctrlPr>
                           <a:rPr lang="es-UY" i="1">
-                            <a:latin typeface="Cambria Math"/>
+                            <a:latin typeface="Cambria Math" panose="02040503050406030204" pitchFamily="18" charset="0"/>
                           </a:rPr>
                         </m:ctrlPr>
                       </m:sSubPr>
@@ -4130,7 +4147,7 @@
                       <m:sSubPr>
                         <m:ctrlPr>
                           <a:rPr lang="es-UY" i="1">
-                            <a:latin typeface="Cambria Math"/>
+                            <a:latin typeface="Cambria Math" panose="02040503050406030204" pitchFamily="18" charset="0"/>
                           </a:rPr>
                         </m:ctrlPr>
                       </m:sSubPr>
@@ -4169,7 +4186,7 @@
                       <m:sSubPr>
                         <m:ctrlPr>
                           <a:rPr lang="es-UY" i="1">
-                            <a:latin typeface="Cambria Math"/>
+                            <a:latin typeface="Cambria Math" panose="02040503050406030204" pitchFamily="18" charset="0"/>
                           </a:rPr>
                         </m:ctrlPr>
                       </m:sSubPr>
@@ -4208,7 +4225,7 @@
                       <m:sSubPr>
                         <m:ctrlPr>
                           <a:rPr lang="es-UY" i="1">
-                            <a:latin typeface="Cambria Math"/>
+                            <a:latin typeface="Cambria Math" panose="02040503050406030204" pitchFamily="18" charset="0"/>
                           </a:rPr>
                         </m:ctrlPr>
                       </m:sSubPr>
@@ -4251,7 +4268,7 @@
                       <m:sSubPr>
                         <m:ctrlPr>
                           <a:rPr lang="es-UY" i="1">
-                            <a:latin typeface="Cambria Math"/>
+                            <a:latin typeface="Cambria Math" panose="02040503050406030204" pitchFamily="18" charset="0"/>
                           </a:rPr>
                         </m:ctrlPr>
                       </m:sSubPr>
@@ -4296,7 +4313,7 @@
                       <m:sSubPr>
                         <m:ctrlPr>
                           <a:rPr lang="es-UY" i="1">
-                            <a:latin typeface="Cambria Math"/>
+                            <a:latin typeface="Cambria Math" panose="02040503050406030204" pitchFamily="18" charset="0"/>
                           </a:rPr>
                         </m:ctrlPr>
                       </m:sSubPr>
@@ -4339,7 +4356,7 @@
                       <m:sSubPr>
                         <m:ctrlPr>
                           <a:rPr lang="es-UY" i="1">
-                            <a:latin typeface="Cambria Math"/>
+                            <a:latin typeface="Cambria Math" panose="02040503050406030204" pitchFamily="18" charset="0"/>
                           </a:rPr>
                         </m:ctrlPr>
                       </m:sSubPr>
@@ -4378,7 +4395,7 @@
                       <m:sSubPr>
                         <m:ctrlPr>
                           <a:rPr lang="es-UY" i="1">
-                            <a:latin typeface="Cambria Math"/>
+                            <a:latin typeface="Cambria Math" panose="02040503050406030204" pitchFamily="18" charset="0"/>
                           </a:rPr>
                         </m:ctrlPr>
                       </m:sSubPr>
@@ -4421,7 +4438,7 @@
                       <m:sSubPr>
                         <m:ctrlPr>
                           <a:rPr lang="es-UY" i="1">
-                            <a:latin typeface="Cambria Math"/>
+                            <a:latin typeface="Cambria Math" panose="02040503050406030204" pitchFamily="18" charset="0"/>
                           </a:rPr>
                         </m:ctrlPr>
                       </m:sSubPr>
@@ -4466,7 +4483,7 @@
                       <m:sSubPr>
                         <m:ctrlPr>
                           <a:rPr lang="es-UY" i="1">
-                            <a:latin typeface="Cambria Math"/>
+                            <a:latin typeface="Cambria Math" panose="02040503050406030204" pitchFamily="18" charset="0"/>
                           </a:rPr>
                         </m:ctrlPr>
                       </m:sSubPr>
@@ -4505,7 +4522,7 @@
                       <m:sSubPr>
                         <m:ctrlPr>
                           <a:rPr lang="es-UY" i="1">
-                            <a:latin typeface="Cambria Math"/>
+                            <a:latin typeface="Cambria Math" panose="02040503050406030204" pitchFamily="18" charset="0"/>
                           </a:rPr>
                         </m:ctrlPr>
                       </m:sSubPr>
@@ -4550,7 +4567,7 @@
                       <m:sSubPr>
                         <m:ctrlPr>
                           <a:rPr lang="es-UY" i="1">
-                            <a:latin typeface="Cambria Math"/>
+                            <a:latin typeface="Cambria Math" panose="02040503050406030204" pitchFamily="18" charset="0"/>
                           </a:rPr>
                         </m:ctrlPr>
                       </m:sSubPr>
@@ -4940,6 +4957,13 @@
   <p:clrMapOvr>
     <a:masterClrMapping/>
   </p:clrMapOvr>
+  <p:timing>
+    <p:tnLst>
+      <p:par>
+        <p:cTn id="1" dur="indefinite" restart="never" nodeType="tmRoot"/>
+      </p:par>
+    </p:tnLst>
+  </p:timing>
 </p:sld>
 </file>
 
@@ -4973,14 +4997,25 @@
         <p:spPr/>
         <p:txBody>
           <a:bodyPr>
-            <a:normAutofit/>
+            <a:normAutofit fontScale="90000"/>
           </a:bodyPr>
           <a:lstStyle/>
           <a:p>
             <a:r>
+              <a:rPr lang="es-UY" dirty="0" err="1" smtClean="0"/>
+              <a:t>MDVRP</a:t>
+            </a:r>
+            <a:r>
+              <a:rPr lang="es-UY" dirty="0" smtClean="0"/>
+              <a:t>-  Solución, implementación. </a:t>
+            </a:r>
+            <a:r>
               <a:rPr lang="en-US" dirty="0" smtClean="0"/>
-              <a:t>MDVRP- </a:t>
-            </a:r>
+              <a:t/>
+            </a:r>
+            <a:br>
+              <a:rPr lang="en-US" dirty="0" smtClean="0"/>
+            </a:br>
             <a:r>
               <a:rPr lang="es-UY" dirty="0" smtClean="0"/>
               <a:t>Generación de mapa a partir de una matriz de distancias</a:t>
@@ -5193,6 +5228,13 @@
   <p:clrMapOvr>
     <a:masterClrMapping/>
   </p:clrMapOvr>
+  <p:timing>
+    <p:tnLst>
+      <p:par>
+        <p:cTn id="1" dur="indefinite" restart="never" nodeType="tmRoot"/>
+      </p:par>
+    </p:tnLst>
+  </p:timing>
 </p:sld>
 </file>
 
@@ -5315,32 +5357,27 @@
           <a:lstStyle/>
           <a:p>
             <a:r>
-              <a:rPr lang="en-US" dirty="0" smtClean="0"/>
-              <a:t>MDVRP- </a:t>
-            </a:r>
-            <a:r>
-              <a:rPr lang="en-US" dirty="0" err="1" smtClean="0"/>
-              <a:t>Generación</a:t>
-            </a:r>
-            <a:r>
-              <a:rPr lang="en-US" dirty="0" smtClean="0"/>
-              <a:t> </a:t>
-            </a:r>
-            <a:r>
-              <a:rPr lang="en-US" dirty="0" err="1" smtClean="0"/>
-              <a:t>randómica</a:t>
-            </a:r>
-            <a:r>
-              <a:rPr lang="en-US" dirty="0" smtClean="0"/>
-              <a:t> y </a:t>
-            </a:r>
-            <a:r>
-              <a:rPr lang="en-US" dirty="0" err="1" smtClean="0"/>
-              <a:t>otros</a:t>
-            </a:r>
-            <a:r>
-              <a:rPr lang="en-US" dirty="0" smtClean="0"/>
-              <a:t>...</a:t>
+              <a:rPr lang="es-UY" dirty="0" err="1" smtClean="0"/>
+              <a:t>MDVRP</a:t>
+            </a:r>
+            <a:r>
+              <a:rPr lang="es-UY" dirty="0" smtClean="0"/>
+              <a:t>-  </a:t>
+            </a:r>
+            <a:r>
+              <a:rPr lang="es-UY" dirty="0"/>
+              <a:t>Solución, implementación. </a:t>
+            </a:r>
+            <a:r>
+              <a:rPr lang="es-UY" dirty="0" smtClean="0"/>
+              <a:t/>
+            </a:r>
+            <a:br>
+              <a:rPr lang="es-UY" dirty="0" smtClean="0"/>
+            </a:br>
+            <a:r>
+              <a:rPr lang="es-UY" dirty="0" smtClean="0"/>
+              <a:t>Generación de casos de prueba aleatorios.</a:t>
             </a:r>
             <a:endParaRPr lang="es-UY" dirty="0"/>
           </a:p>
@@ -5358,26 +5395,119 @@
         </p:nvSpPr>
         <p:spPr/>
         <p:txBody>
-          <a:bodyPr/>
+          <a:bodyPr>
+            <a:normAutofit fontScale="92500" lnSpcReduction="10000"/>
+          </a:bodyPr>
           <a:lstStyle/>
           <a:p>
             <a:r>
-              <a:rPr lang="es-UY" dirty="0" smtClean="0">
-                <a:solidFill>
-                  <a:schemeClr val="accent1">
-                    <a:lumMod val="50000"/>
-                  </a:schemeClr>
-                </a:solidFill>
-              </a:rPr>
-              <a:t>Fran</a:t>
-            </a:r>
-            <a:endParaRPr lang="es-UY" dirty="0">
-              <a:solidFill>
-                <a:schemeClr val="accent1">
-                  <a:lumMod val="50000"/>
-                </a:schemeClr>
-              </a:solidFill>
-            </a:endParaRPr>
+              <a:rPr lang="es-ES" dirty="0" smtClean="0"/>
+              <a:t>El proceso de generación de escenarios aleatorios permite generar clientes, depósitos y sus capacidades de forma aleatoria. De este modo se tienen juegos de datos para 1000 clientes o mas. </a:t>
+            </a:r>
+          </a:p>
+          <a:p>
+            <a:r>
+              <a:rPr lang="es-ES" dirty="0" smtClean="0"/>
+              <a:t>Características:</a:t>
+            </a:r>
+          </a:p>
+          <a:p>
+            <a:pPr lvl="1"/>
+            <a:r>
+              <a:rPr lang="es-ES" dirty="0" smtClean="0"/>
+              <a:t>El formato del mismo corresponde con el formato de </a:t>
+            </a:r>
+            <a:r>
+              <a:rPr lang="es-ES" dirty="0" err="1" smtClean="0"/>
+              <a:t>TSPLib</a:t>
+            </a:r>
+            <a:r>
+              <a:rPr lang="es-ES" dirty="0" smtClean="0"/>
+              <a:t>.  </a:t>
+            </a:r>
+          </a:p>
+          <a:p>
+            <a:pPr lvl="1"/>
+            <a:r>
+              <a:rPr lang="es-ES" dirty="0" smtClean="0"/>
+              <a:t>Permitiendo parametrizar el numero de clientes y depósitos.</a:t>
+            </a:r>
+          </a:p>
+          <a:p>
+            <a:pPr lvl="1"/>
+            <a:r>
+              <a:rPr lang="es-ES" dirty="0" smtClean="0"/>
+              <a:t>Demanda de clientes (</a:t>
+            </a:r>
+            <a:r>
+              <a:rPr lang="es-ES" dirty="0" err="1" smtClean="0"/>
+              <a:t>v.a.</a:t>
+            </a:r>
+            <a:r>
+              <a:rPr lang="es-ES" dirty="0" smtClean="0"/>
+              <a:t> uniforme en un Intervalo (</a:t>
+            </a:r>
+            <a:r>
+              <a:rPr lang="es-ES" dirty="0" err="1" smtClean="0"/>
+              <a:t>a,b</a:t>
+            </a:r>
+            <a:r>
+              <a:rPr lang="es-ES" dirty="0" smtClean="0"/>
+              <a:t>))</a:t>
+            </a:r>
+          </a:p>
+          <a:p>
+            <a:pPr lvl="1"/>
+            <a:r>
+              <a:rPr lang="es-ES" dirty="0" smtClean="0"/>
+              <a:t>Oferta de los depósitos:</a:t>
+            </a:r>
+          </a:p>
+          <a:p>
+            <a:pPr lvl="2"/>
+            <a:r>
+              <a:rPr lang="es-ES" dirty="0"/>
+              <a:t>P</a:t>
+            </a:r>
+            <a:r>
+              <a:rPr lang="es-ES" dirty="0" smtClean="0"/>
+              <a:t>uede ser igual o distinta en todos los depósitos.</a:t>
+            </a:r>
+          </a:p>
+          <a:p>
+            <a:pPr lvl="2"/>
+            <a:r>
+              <a:rPr lang="es-ES" dirty="0" smtClean="0"/>
+              <a:t>Puede sobrepasar la demanda de los clientes en un porcentaje dado (10%, 20%... </a:t>
+            </a:r>
+            <a:r>
+              <a:rPr lang="es-ES" dirty="0" err="1" smtClean="0"/>
+              <a:t>Etc</a:t>
+            </a:r>
+            <a:r>
+              <a:rPr lang="es-ES" dirty="0" smtClean="0"/>
+              <a:t>).</a:t>
+            </a:r>
+          </a:p>
+          <a:p>
+            <a:pPr lvl="1"/>
+            <a:r>
+              <a:rPr lang="es-ES" dirty="0" smtClean="0"/>
+              <a:t>Con la misma semilla, pueden existir varios juegos de datos que solo varia la demanda de los depósitos para el análisis de este comportamiento.</a:t>
+            </a:r>
+          </a:p>
+          <a:p>
+            <a:pPr lvl="1"/>
+            <a:r>
+              <a:rPr lang="es-ES" dirty="0" smtClean="0"/>
+              <a:t>Se probo con 10.000 clientes y 500 depósitos.</a:t>
+            </a:r>
+          </a:p>
+          <a:p>
+            <a:pPr marL="457200" lvl="1" indent="0">
+              <a:buNone/>
+            </a:pPr>
+            <a:endParaRPr lang="es-UY" dirty="0"/>
           </a:p>
         </p:txBody>
       </p:sp>
@@ -5391,6 +5521,13 @@
   <p:clrMapOvr>
     <a:masterClrMapping/>
   </p:clrMapOvr>
+  <p:timing>
+    <p:tnLst>
+      <p:par>
+        <p:cTn id="1" dur="indefinite" restart="never" nodeType="tmRoot"/>
+      </p:par>
+    </p:tnLst>
+  </p:timing>
 </p:sld>
 </file>
 
@@ -5427,47 +5564,19 @@
           <a:lstStyle/>
           <a:p>
             <a:r>
-              <a:rPr lang="en-US" dirty="0" err="1" smtClean="0"/>
+              <a:rPr lang="es-UY" dirty="0" err="1" smtClean="0"/>
               <a:t>MDVRP</a:t>
             </a:r>
             <a:r>
-              <a:rPr lang="en-US" dirty="0" smtClean="0"/>
-              <a:t>- </a:t>
-            </a:r>
-            <a:r>
-              <a:rPr lang="en-US" dirty="0" err="1" smtClean="0"/>
-              <a:t>Solucion</a:t>
-            </a:r>
-            <a:r>
-              <a:rPr lang="en-US" dirty="0" smtClean="0"/>
-              <a:t>, </a:t>
-            </a:r>
-            <a:r>
-              <a:rPr lang="en-US" dirty="0" err="1" smtClean="0"/>
-              <a:t>Testeo</a:t>
-            </a:r>
-            <a:r>
-              <a:rPr lang="en-US" dirty="0" smtClean="0"/>
-              <a:t>.</a:t>
+              <a:rPr lang="es-UY" dirty="0" smtClean="0"/>
+              <a:t>- Solución, Testeo.</a:t>
             </a:r>
             <a:br>
-              <a:rPr lang="en-US" dirty="0" smtClean="0"/>
+              <a:rPr lang="es-UY" dirty="0" smtClean="0"/>
             </a:br>
             <a:r>
-              <a:rPr lang="en-US" dirty="0" err="1" smtClean="0"/>
-              <a:t>Casos</a:t>
-            </a:r>
-            <a:r>
-              <a:rPr lang="en-US" dirty="0" smtClean="0"/>
-              <a:t> De </a:t>
-            </a:r>
-            <a:r>
-              <a:rPr lang="en-US" dirty="0" err="1" smtClean="0"/>
-              <a:t>Prueba</a:t>
-            </a:r>
-            <a:r>
-              <a:rPr lang="en-US" dirty="0" smtClean="0"/>
-              <a:t>.</a:t>
+              <a:rPr lang="es-UY" dirty="0" smtClean="0"/>
+              <a:t>Casos De Prueba.</a:t>
             </a:r>
             <a:endParaRPr lang="es-UY" dirty="0"/>
           </a:p>
@@ -5483,89 +5592,213 @@
             <p:ph idx="1"/>
           </p:nvPr>
         </p:nvSpPr>
-        <p:spPr/>
+        <p:spPr>
+          <a:xfrm>
+            <a:off x="838200" y="1839693"/>
+            <a:ext cx="10515600" cy="4351338"/>
+          </a:xfrm>
+        </p:spPr>
         <p:txBody>
           <a:bodyPr/>
           <a:lstStyle/>
           <a:p>
             <a:r>
+              <a:rPr lang="es-UY" dirty="0" smtClean="0"/>
+              <a:t>A:  Ejemplo de </a:t>
+            </a:r>
+            <a:r>
+              <a:rPr lang="es-UY" dirty="0" err="1" smtClean="0"/>
+              <a:t>TSPLib</a:t>
+            </a:r>
+            <a:r>
+              <a:rPr lang="es-UY" dirty="0" smtClean="0"/>
+              <a:t> (cap. de depósitos modificada) </a:t>
+            </a:r>
+          </a:p>
+          <a:p>
+            <a:r>
+              <a:rPr lang="es-UY" dirty="0" smtClean="0"/>
+              <a:t>B:  Depósitos con = </a:t>
+            </a:r>
+            <a:r>
+              <a:rPr lang="es-UY" dirty="0" err="1" smtClean="0"/>
+              <a:t>cap</a:t>
+            </a:r>
+            <a:endParaRPr lang="es-UY" dirty="0" smtClean="0"/>
+          </a:p>
+          <a:p>
+            <a:pPr lvl="1"/>
+            <a:r>
+              <a:rPr lang="es-UY" dirty="0" err="1" smtClean="0"/>
+              <a:t>B1</a:t>
+            </a:r>
+            <a:r>
+              <a:rPr lang="es-UY" dirty="0" smtClean="0"/>
+              <a:t> 0%</a:t>
+            </a:r>
+          </a:p>
+          <a:p>
+            <a:pPr lvl="1"/>
+            <a:r>
+              <a:rPr lang="es-UY" dirty="0" err="1" smtClean="0"/>
+              <a:t>B2</a:t>
+            </a:r>
+            <a:r>
+              <a:rPr lang="es-UY" dirty="0" smtClean="0"/>
+              <a:t> 10%</a:t>
+            </a:r>
+          </a:p>
+          <a:p>
+            <a:pPr lvl="1"/>
+            <a:r>
+              <a:rPr lang="es-UY" dirty="0" err="1" smtClean="0"/>
+              <a:t>B3</a:t>
+            </a:r>
+            <a:r>
+              <a:rPr lang="es-UY" dirty="0" smtClean="0"/>
+              <a:t> 20%</a:t>
+            </a:r>
+          </a:p>
+          <a:p>
+            <a:r>
               <a:rPr lang="en-US" dirty="0" smtClean="0"/>
-              <a:t>A</a:t>
-            </a:r>
-          </a:p>
-          <a:p>
-            <a:r>
-              <a:rPr lang="en-US" dirty="0" smtClean="0"/>
-              <a:t>B</a:t>
-            </a:r>
-          </a:p>
-          <a:p>
-            <a:pPr lvl="1"/>
-            <a:r>
-              <a:rPr lang="en-US" dirty="0" err="1" smtClean="0"/>
-              <a:t>B1</a:t>
-            </a:r>
-            <a:endParaRPr lang="en-US" dirty="0" smtClean="0"/>
-          </a:p>
-          <a:p>
-            <a:pPr lvl="1"/>
-            <a:r>
-              <a:rPr lang="en-US" dirty="0" err="1" smtClean="0"/>
-              <a:t>B2</a:t>
-            </a:r>
-            <a:endParaRPr lang="en-US" dirty="0" smtClean="0"/>
-          </a:p>
-          <a:p>
-            <a:pPr lvl="1"/>
-            <a:r>
-              <a:rPr lang="en-US" dirty="0" err="1" smtClean="0"/>
-              <a:t>B3</a:t>
-            </a:r>
-            <a:endParaRPr lang="en-US" dirty="0" smtClean="0"/>
-          </a:p>
-          <a:p>
-            <a:r>
-              <a:rPr lang="en-US" dirty="0" smtClean="0"/>
-              <a:t>C</a:t>
-            </a:r>
-            <a:r>
-              <a:rPr lang="es-UY" dirty="0">
+              <a:t>C:</a:t>
+            </a:r>
+            <a:r>
+              <a:rPr lang="es-UY" dirty="0" smtClean="0">
                 <a:solidFill>
                   <a:schemeClr val="accent1">
                     <a:lumMod val="50000"/>
                   </a:schemeClr>
                 </a:solidFill>
               </a:rPr>
-              <a:t> Fran</a:t>
-            </a:r>
-            <a:endParaRPr lang="en-US" dirty="0" smtClean="0"/>
+              <a:t> </a:t>
+            </a:r>
+            <a:r>
+              <a:rPr lang="es-UY" dirty="0" smtClean="0"/>
+              <a:t>Depósitos con </a:t>
+            </a:r>
+            <a:r>
+              <a:rPr lang="en-US" dirty="0" smtClean="0"/>
+              <a:t>≠</a:t>
+            </a:r>
+            <a:r>
+              <a:rPr lang="es-UY" dirty="0" smtClean="0"/>
+              <a:t> </a:t>
+            </a:r>
+            <a:r>
+              <a:rPr lang="es-UY" dirty="0" err="1" smtClean="0"/>
+              <a:t>cap</a:t>
+            </a:r>
+            <a:endParaRPr lang="en-US" dirty="0"/>
           </a:p>
           <a:p>
             <a:pPr lvl="1"/>
             <a:r>
-              <a:rPr lang="en-US" dirty="0" err="1" smtClean="0"/>
+              <a:rPr lang="es-UY" dirty="0" err="1" smtClean="0"/>
               <a:t>C1</a:t>
             </a:r>
-            <a:endParaRPr lang="en-US" dirty="0" smtClean="0"/>
+            <a:r>
+              <a:rPr lang="es-UY" dirty="0" smtClean="0"/>
+              <a:t> 0%</a:t>
+            </a:r>
           </a:p>
           <a:p>
             <a:pPr lvl="1"/>
             <a:r>
-              <a:rPr lang="en-US" dirty="0" err="1" smtClean="0"/>
+              <a:rPr lang="es-UY" dirty="0" err="1" smtClean="0"/>
               <a:t>C2</a:t>
             </a:r>
-            <a:endParaRPr lang="en-US" dirty="0"/>
+            <a:r>
+              <a:rPr lang="es-UY" dirty="0" smtClean="0"/>
+              <a:t> 10%</a:t>
+            </a:r>
           </a:p>
           <a:p>
             <a:pPr lvl="1"/>
             <a:r>
-              <a:rPr lang="en-US" dirty="0" err="1" smtClean="0"/>
+              <a:rPr lang="es-UY" dirty="0" err="1" smtClean="0"/>
               <a:t>C3</a:t>
             </a:r>
-            <a:endParaRPr lang="en-US" dirty="0" smtClean="0"/>
-          </a:p>
-        </p:txBody>
-      </p:sp>
+            <a:r>
+              <a:rPr lang="es-UY" dirty="0" smtClean="0"/>
+              <a:t> 20%</a:t>
+            </a:r>
+          </a:p>
+        </p:txBody>
+      </p:sp>
+      <p:pic>
+        <p:nvPicPr>
+          <p:cNvPr id="4" name="Picture 3"/>
+          <p:cNvPicPr>
+            <a:picLocks noChangeAspect="1"/>
+          </p:cNvPicPr>
+          <p:nvPr/>
+        </p:nvPicPr>
+        <p:blipFill>
+          <a:blip r:embed="rId2"/>
+          <a:stretch>
+            <a:fillRect/>
+          </a:stretch>
+        </p:blipFill>
+        <p:spPr>
+          <a:xfrm>
+            <a:off x="8792749" y="734742"/>
+            <a:ext cx="1924050" cy="1743075"/>
+          </a:xfrm>
+          <a:prstGeom prst="rect">
+            <a:avLst/>
+          </a:prstGeom>
+        </p:spPr>
+      </p:pic>
+      <p:pic>
+        <p:nvPicPr>
+          <p:cNvPr id="6" name="Picture 5"/>
+          <p:cNvPicPr>
+            <a:picLocks noChangeAspect="1"/>
+          </p:cNvPicPr>
+          <p:nvPr/>
+        </p:nvPicPr>
+        <p:blipFill>
+          <a:blip r:embed="rId3"/>
+          <a:stretch>
+            <a:fillRect/>
+          </a:stretch>
+        </p:blipFill>
+        <p:spPr>
+          <a:xfrm>
+            <a:off x="5207245" y="2438437"/>
+            <a:ext cx="5467350" cy="1704975"/>
+          </a:xfrm>
+          <a:prstGeom prst="rect">
+            <a:avLst/>
+          </a:prstGeom>
+        </p:spPr>
+      </p:pic>
+      <p:pic>
+        <p:nvPicPr>
+          <p:cNvPr id="7" name="Picture 6"/>
+          <p:cNvPicPr>
+            <a:picLocks noChangeAspect="1"/>
+          </p:cNvPicPr>
+          <p:nvPr/>
+        </p:nvPicPr>
+        <p:blipFill>
+          <a:blip r:embed="rId4"/>
+          <a:stretch>
+            <a:fillRect/>
+          </a:stretch>
+        </p:blipFill>
+        <p:spPr>
+          <a:xfrm>
+            <a:off x="5207245" y="4157480"/>
+            <a:ext cx="5467350" cy="1914525"/>
+          </a:xfrm>
+          <a:prstGeom prst="rect">
+            <a:avLst/>
+          </a:prstGeom>
+        </p:spPr>
+      </p:pic>
     </p:spTree>
     <p:extLst>
       <p:ext uri="{BB962C8B-B14F-4D97-AF65-F5344CB8AC3E}">
@@ -5576,6 +5809,13 @@
   <p:clrMapOvr>
     <a:masterClrMapping/>
   </p:clrMapOvr>
+  <p:timing>
+    <p:tnLst>
+      <p:par>
+        <p:cTn id="1" dur="indefinite" restart="never" nodeType="tmRoot"/>
+      </p:par>
+    </p:tnLst>
+  </p:timing>
 </p:sld>
 </file>
 
@@ -5612,35 +5852,19 @@
           <a:lstStyle/>
           <a:p>
             <a:r>
-              <a:rPr lang="en-US" dirty="0" err="1" smtClean="0"/>
+              <a:rPr lang="es-UY" dirty="0" err="1" smtClean="0"/>
               <a:t>MDVRP</a:t>
             </a:r>
             <a:r>
-              <a:rPr lang="en-US" dirty="0" smtClean="0"/>
-              <a:t>- </a:t>
-            </a:r>
-            <a:r>
-              <a:rPr lang="en-US" dirty="0" err="1" smtClean="0"/>
-              <a:t>Solucion</a:t>
-            </a:r>
-            <a:r>
-              <a:rPr lang="en-US" dirty="0" smtClean="0"/>
-              <a:t>, </a:t>
-            </a:r>
-            <a:r>
-              <a:rPr lang="en-US" dirty="0" err="1" smtClean="0"/>
-              <a:t>Testeo</a:t>
-            </a:r>
-            <a:r>
-              <a:rPr lang="en-US" dirty="0" smtClean="0"/>
-              <a:t>.</a:t>
+              <a:rPr lang="es-UY" dirty="0" smtClean="0"/>
+              <a:t>- Solución, Testeo.</a:t>
             </a:r>
             <a:br>
-              <a:rPr lang="en-US" dirty="0" smtClean="0"/>
+              <a:rPr lang="es-UY" dirty="0" smtClean="0"/>
             </a:br>
             <a:r>
-              <a:rPr lang="en-US" dirty="0" err="1" smtClean="0"/>
-              <a:t>Metricas</a:t>
+              <a:rPr lang="es-UY" dirty="0" smtClean="0"/>
+              <a:t>Métricas Utilizadas.</a:t>
             </a:r>
             <a:endParaRPr lang="es-UY" dirty="0"/>
           </a:p>
@@ -5663,219 +5887,104 @@
           <a:p>
             <a:pPr lvl="1"/>
             <a:r>
-              <a:rPr lang="en-US" dirty="0" err="1" smtClean="0"/>
-              <a:t>Tiempo</a:t>
-            </a:r>
-            <a:r>
-              <a:rPr lang="en-US" dirty="0" smtClean="0"/>
-              <a:t> de </a:t>
-            </a:r>
-            <a:r>
-              <a:rPr lang="en-US" dirty="0" err="1" smtClean="0"/>
-              <a:t>ejecucion</a:t>
+              <a:rPr lang="es-UY" dirty="0" smtClean="0"/>
+              <a:t>Tiempo de ejecución.</a:t>
+            </a:r>
+          </a:p>
+          <a:p>
+            <a:pPr lvl="2"/>
+            <a:r>
+              <a:rPr lang="es-ES" dirty="0" smtClean="0"/>
+              <a:t>El </a:t>
+            </a:r>
+            <a:r>
+              <a:rPr lang="es-ES" dirty="0"/>
+              <a:t>mismo consiste en el tiempo que demora en correr el </a:t>
+            </a:r>
+            <a:r>
+              <a:rPr lang="es-ES" dirty="0" smtClean="0"/>
+              <a:t>algoritmo.</a:t>
+            </a:r>
+          </a:p>
+          <a:p>
+            <a:pPr lvl="2"/>
+            <a:r>
+              <a:rPr lang="es-UY" dirty="0" smtClean="0"/>
+              <a:t>Permite comparar los tiempos de los distintos algoritmos.</a:t>
+            </a:r>
+          </a:p>
+          <a:p>
+            <a:pPr lvl="1"/>
+            <a:r>
+              <a:rPr lang="es-UY" dirty="0" smtClean="0"/>
+              <a:t>Costo (Distancia recorrida)</a:t>
+            </a:r>
+          </a:p>
+          <a:p>
+            <a:pPr lvl="2"/>
+            <a:r>
+              <a:rPr lang="es-ES" dirty="0" smtClean="0"/>
+              <a:t>Es </a:t>
+            </a:r>
+            <a:r>
+              <a:rPr lang="es-ES" dirty="0"/>
+              <a:t>la suma de los recorridos de todos los  vehículos para todos los depósitos</a:t>
+            </a:r>
+            <a:r>
+              <a:rPr lang="es-ES" dirty="0" smtClean="0"/>
+              <a:t>.</a:t>
             </a:r>
             <a:endParaRPr lang="en-US" dirty="0" smtClean="0"/>
           </a:p>
           <a:p>
             <a:pPr lvl="2"/>
             <a:r>
-              <a:rPr lang="en-US" dirty="0" err="1" smtClean="0"/>
-              <a:t>Permite</a:t>
-            </a:r>
-            <a:r>
-              <a:rPr lang="en-US" dirty="0" smtClean="0"/>
-              <a:t> comparer </a:t>
-            </a:r>
-            <a:r>
-              <a:rPr lang="en-US" dirty="0" err="1" smtClean="0"/>
-              <a:t>los</a:t>
-            </a:r>
-            <a:r>
-              <a:rPr lang="en-US" dirty="0" smtClean="0"/>
-              <a:t> </a:t>
-            </a:r>
-            <a:r>
-              <a:rPr lang="en-US" dirty="0" err="1" smtClean="0"/>
-              <a:t>distintos</a:t>
-            </a:r>
-            <a:r>
-              <a:rPr lang="en-US" dirty="0" smtClean="0"/>
-              <a:t> </a:t>
-            </a:r>
-            <a:r>
-              <a:rPr lang="en-US" dirty="0" err="1" smtClean="0"/>
-              <a:t>algoritmos</a:t>
+              <a:rPr lang="es-UY" dirty="0" smtClean="0"/>
+              <a:t>Permite comparar los costos de los distintos algoritmos.</a:t>
+            </a:r>
+          </a:p>
+          <a:p>
+            <a:pPr lvl="1"/>
+            <a:r>
+              <a:rPr lang="es-UY" dirty="0" smtClean="0"/>
+              <a:t>Penalidad </a:t>
+            </a:r>
+          </a:p>
+          <a:p>
+            <a:pPr lvl="2"/>
+            <a:r>
+              <a:rPr lang="es-UY" dirty="0" smtClean="0"/>
+              <a:t>Se calcula a partir de la demanda de los clientes y la oferta de los depósitos</a:t>
             </a:r>
             <a:r>
               <a:rPr lang="en-US" dirty="0" smtClean="0"/>
               <a:t>.</a:t>
             </a:r>
-          </a:p>
-          <a:p>
-            <a:pPr lvl="1"/>
-            <a:r>
-              <a:rPr lang="en-US" dirty="0" err="1" smtClean="0"/>
-              <a:t>Penalidad</a:t>
-            </a:r>
-            <a:r>
-              <a:rPr lang="en-US" dirty="0" smtClean="0"/>
-              <a:t> (</a:t>
-            </a:r>
-            <a:r>
-              <a:rPr lang="en-US" dirty="0" err="1" smtClean="0"/>
-              <a:t>principalemnte</a:t>
-            </a:r>
-            <a:r>
-              <a:rPr lang="en-US" dirty="0" smtClean="0"/>
-              <a:t> para el </a:t>
-            </a:r>
-            <a:r>
-              <a:rPr lang="en-US" dirty="0" err="1" smtClean="0"/>
-              <a:t>caso</a:t>
-            </a:r>
-            <a:r>
-              <a:rPr lang="en-US" dirty="0" smtClean="0"/>
-              <a:t> de DI) ????</a:t>
-            </a:r>
-          </a:p>
-          <a:p>
-            <a:pPr marL="914400" lvl="2" indent="0">
+            <a:endParaRPr lang="es-UY" dirty="0" smtClean="0"/>
+          </a:p>
+          <a:p>
+            <a:pPr lvl="2"/>
+            <a:r>
+              <a:rPr lang="es-UY" dirty="0" smtClean="0"/>
+              <a:t>Permite analizar el problema del algoritmo por Urgencia y su carencia al no manejar capacidades. </a:t>
+            </a:r>
+            <a:endParaRPr lang="es-UY" dirty="0" smtClean="0"/>
+          </a:p>
+          <a:p>
+            <a:pPr lvl="2"/>
+            <a:r>
+              <a:rPr lang="es-UY" dirty="0" smtClean="0"/>
+              <a:t>Permite </a:t>
+            </a:r>
+            <a:r>
+              <a:rPr lang="es-UY" dirty="0" smtClean="0"/>
+              <a:t>cuantificar el impacto cuando los depósitos no pueden cubrir las demandas de los clientes.</a:t>
+            </a:r>
+          </a:p>
+          <a:p>
+            <a:pPr marL="457200" lvl="1" indent="0">
               <a:buNone/>
             </a:pPr>
-            <a:r>
-              <a:rPr lang="en-US" dirty="0" err="1" smtClean="0"/>
-              <a:t>Permite</a:t>
-            </a:r>
-            <a:r>
-              <a:rPr lang="en-US" dirty="0" smtClean="0"/>
-              <a:t> </a:t>
-            </a:r>
-            <a:r>
-              <a:rPr lang="en-US" dirty="0" err="1" smtClean="0"/>
-              <a:t>analizar</a:t>
-            </a:r>
-            <a:r>
-              <a:rPr lang="en-US" dirty="0" smtClean="0"/>
-              <a:t> el </a:t>
-            </a:r>
-            <a:r>
-              <a:rPr lang="en-US" dirty="0" err="1" smtClean="0"/>
-              <a:t>problema</a:t>
-            </a:r>
-            <a:r>
-              <a:rPr lang="en-US" dirty="0" smtClean="0"/>
-              <a:t> del </a:t>
-            </a:r>
-            <a:r>
-              <a:rPr lang="en-US" dirty="0" err="1" smtClean="0"/>
-              <a:t>algoritmo</a:t>
-            </a:r>
-            <a:r>
-              <a:rPr lang="en-US" dirty="0" smtClean="0"/>
-              <a:t> </a:t>
-            </a:r>
-            <a:r>
-              <a:rPr lang="en-US" dirty="0" err="1" smtClean="0"/>
-              <a:t>por</a:t>
-            </a:r>
-            <a:r>
-              <a:rPr lang="en-US" dirty="0" smtClean="0"/>
-              <a:t> </a:t>
-            </a:r>
-            <a:r>
-              <a:rPr lang="en-US" dirty="0" err="1" smtClean="0"/>
-              <a:t>Urgencia</a:t>
-            </a:r>
-            <a:r>
-              <a:rPr lang="en-US" dirty="0" smtClean="0"/>
-              <a:t> y </a:t>
-            </a:r>
-            <a:r>
-              <a:rPr lang="en-US" dirty="0" err="1" smtClean="0"/>
-              <a:t>su</a:t>
-            </a:r>
-            <a:r>
-              <a:rPr lang="en-US" dirty="0" smtClean="0"/>
-              <a:t> </a:t>
-            </a:r>
-            <a:r>
-              <a:rPr lang="en-US" dirty="0" err="1" smtClean="0"/>
-              <a:t>penalidad</a:t>
-            </a:r>
-            <a:r>
-              <a:rPr lang="en-US" dirty="0" smtClean="0"/>
-              <a:t> con </a:t>
-            </a:r>
-            <a:r>
-              <a:rPr lang="en-US" dirty="0" err="1" smtClean="0"/>
-              <a:t>als</a:t>
-            </a:r>
-            <a:r>
-              <a:rPr lang="en-US" dirty="0" smtClean="0"/>
-              <a:t> </a:t>
-            </a:r>
-            <a:r>
-              <a:rPr lang="en-US" dirty="0" err="1" smtClean="0"/>
-              <a:t>capacidades</a:t>
-            </a:r>
-            <a:r>
-              <a:rPr lang="en-US" dirty="0" smtClean="0"/>
-              <a:t>. (primer </a:t>
-            </a:r>
-            <a:r>
-              <a:rPr lang="en-US" dirty="0" err="1" smtClean="0"/>
-              <a:t>algoritmo</a:t>
-            </a:r>
-            <a:r>
-              <a:rPr lang="en-US" dirty="0"/>
-              <a:t>)</a:t>
-            </a:r>
-            <a:endParaRPr lang="en-US" dirty="0" smtClean="0"/>
-          </a:p>
-          <a:p>
-            <a:pPr lvl="1"/>
-            <a:r>
-              <a:rPr lang="en-US" dirty="0" err="1" smtClean="0"/>
-              <a:t>Costo</a:t>
-            </a:r>
-            <a:endParaRPr lang="en-US" dirty="0" smtClean="0"/>
-          </a:p>
-          <a:p>
-            <a:pPr lvl="2"/>
-            <a:r>
-              <a:rPr lang="en-US" dirty="0" err="1" smtClean="0"/>
-              <a:t>Permite</a:t>
-            </a:r>
-            <a:r>
-              <a:rPr lang="en-US" dirty="0" smtClean="0"/>
-              <a:t> comparer ls </a:t>
-            </a:r>
-            <a:r>
-              <a:rPr lang="en-US" dirty="0" err="1" smtClean="0"/>
-              <a:t>distintos</a:t>
-            </a:r>
-            <a:r>
-              <a:rPr lang="en-US" dirty="0" smtClean="0"/>
-              <a:t> </a:t>
-            </a:r>
-            <a:r>
-              <a:rPr lang="en-US" dirty="0" err="1" smtClean="0"/>
-              <a:t>algortitmos</a:t>
-            </a:r>
-            <a:endParaRPr lang="en-US" dirty="0" smtClean="0"/>
-          </a:p>
-          <a:p>
-            <a:pPr lvl="1"/>
-            <a:r>
-              <a:rPr lang="es-UY" dirty="0">
-                <a:solidFill>
-                  <a:schemeClr val="accent1">
-                    <a:lumMod val="50000"/>
-                  </a:schemeClr>
-                </a:solidFill>
-              </a:rPr>
-              <a:t>Fran</a:t>
-            </a:r>
             <a:endParaRPr lang="es-UY" dirty="0"/>
           </a:p>
         </p:txBody>
@@ -5890,6 +5999,13 @@
   <p:clrMapOvr>
     <a:masterClrMapping/>
   </p:clrMapOvr>
+  <p:timing>
+    <p:tnLst>
+      <p:par>
+        <p:cTn id="1" dur="indefinite" restart="never" nodeType="tmRoot"/>
+      </p:par>
+    </p:tnLst>
+  </p:timing>
 </p:sld>
 </file>
 
@@ -6226,46 +6342,50 @@
           <a:lstStyle/>
           <a:p>
             <a:r>
-              <a:rPr lang="en-US" dirty="0" err="1" smtClean="0"/>
+              <a:rPr lang="es-UY" dirty="0" err="1" smtClean="0"/>
               <a:t>MDVRP</a:t>
             </a:r>
             <a:r>
-              <a:rPr lang="en-US" dirty="0" smtClean="0"/>
+              <a:rPr lang="es-UY" dirty="0" smtClean="0"/>
               <a:t>- </a:t>
             </a:r>
             <a:r>
-              <a:rPr lang="en-US" dirty="0" err="1" smtClean="0"/>
-              <a:t>Solucion</a:t>
-            </a:r>
-            <a:r>
-              <a:rPr lang="en-US" dirty="0" smtClean="0"/>
-              <a:t>, </a:t>
-            </a:r>
-            <a:r>
-              <a:rPr lang="en-US" dirty="0" err="1" smtClean="0"/>
-              <a:t>Testeo</a:t>
-            </a:r>
-            <a:r>
-              <a:rPr lang="en-US" dirty="0" smtClean="0"/>
-              <a:t>.</a:t>
+              <a:rPr lang="es-UY" dirty="0" smtClean="0"/>
+              <a:t>Solución, </a:t>
+            </a:r>
+            <a:r>
+              <a:rPr lang="es-UY" dirty="0" smtClean="0"/>
+              <a:t>Testeo.</a:t>
             </a:r>
             <a:br>
-              <a:rPr lang="en-US" dirty="0" smtClean="0"/>
+              <a:rPr lang="es-UY" dirty="0" smtClean="0"/>
             </a:br>
             <a:r>
-              <a:rPr lang="en-US" dirty="0" err="1" smtClean="0"/>
-              <a:t>Analicis</a:t>
-            </a:r>
-            <a:r>
-              <a:rPr lang="en-US" dirty="0" smtClean="0"/>
-              <a:t> de </a:t>
-            </a:r>
-            <a:r>
-              <a:rPr lang="en-US" dirty="0" err="1" smtClean="0"/>
-              <a:t>Resultados</a:t>
-            </a:r>
-            <a:r>
-              <a:rPr lang="en-US" dirty="0" smtClean="0"/>
+              <a:rPr lang="es-UY" dirty="0" smtClean="0"/>
+              <a:t>Análisis </a:t>
+            </a:r>
+            <a:r>
+              <a:rPr lang="es-UY" dirty="0" smtClean="0"/>
+              <a:t>de </a:t>
+            </a:r>
+            <a:r>
+              <a:rPr lang="es-UY" dirty="0" smtClean="0"/>
+              <a:t>Resultados </a:t>
+            </a:r>
+            <a:r>
+              <a:rPr lang="es-UY" dirty="0" err="1" smtClean="0"/>
+              <a:t>AER</a:t>
+            </a:r>
+            <a:r>
+              <a:rPr lang="es-UY" dirty="0" smtClean="0"/>
+              <a:t> Y </a:t>
+            </a:r>
+            <a:r>
+              <a:rPr lang="es-UY" dirty="0" err="1" smtClean="0"/>
+              <a:t>AEL</a:t>
+            </a:r>
+            <a:r>
+              <a:rPr lang="es-UY" dirty="0" smtClean="0"/>
               <a:t>.</a:t>
             </a:r>
             <a:endParaRPr lang="es-UY" dirty="0"/>
@@ -6319,23 +6439,23 @@
                         </a:spcAft>
                       </a:pPr>
                       <a:r>
-                        <a:rPr lang="es-ES" sz="1100">
+                        <a:rPr lang="es-ES" sz="1100" dirty="0">
                           <a:effectLst/>
                         </a:rPr>
                         <a:t>Caso de </a:t>
                       </a:r>
                       <a:br>
-                        <a:rPr lang="es-ES" sz="1100">
+                        <a:rPr lang="es-ES" sz="1100" dirty="0">
                           <a:effectLst/>
                         </a:rPr>
                       </a:br>
                       <a:r>
-                        <a:rPr lang="es-ES" sz="1100">
+                        <a:rPr lang="es-ES" sz="1100" dirty="0">
                           <a:effectLst/>
                         </a:rPr>
                         <a:t>Estudio</a:t>
                       </a:r>
-                      <a:endParaRPr lang="es-UY" sz="1100">
+                      <a:endParaRPr lang="es-UY" sz="1100" dirty="0">
                         <a:effectLst/>
                         <a:latin typeface="Times New Roman" panose="02020603050405020304" pitchFamily="18" charset="0"/>
                         <a:ea typeface="Times New Roman" panose="02020603050405020304" pitchFamily="18" charset="0"/>
@@ -6948,12 +7068,12 @@
                         </a:spcAft>
                       </a:pPr>
                       <a:r>
-                        <a:rPr lang="es-ES" sz="1100">
+                        <a:rPr lang="es-ES" sz="1100" dirty="0">
                           <a:effectLst/>
                         </a:rPr>
                         <a:t>39,88</a:t>
                       </a:r>
-                      <a:endParaRPr lang="es-UY" sz="1100">
+                      <a:endParaRPr lang="es-UY" sz="1100" dirty="0">
                         <a:effectLst/>
                         <a:latin typeface="Times New Roman" panose="02020603050405020304" pitchFamily="18" charset="0"/>
                         <a:ea typeface="Times New Roman" panose="02020603050405020304" pitchFamily="18" charset="0"/>
@@ -7507,12 +7627,12 @@
                         </a:spcAft>
                       </a:pPr>
                       <a:r>
-                        <a:rPr lang="es-ES" sz="1100">
+                        <a:rPr lang="es-ES" sz="1100" dirty="0">
                           <a:effectLst/>
                         </a:rPr>
                         <a:t>3,87</a:t>
                       </a:r>
-                      <a:endParaRPr lang="es-UY" sz="1100">
+                      <a:endParaRPr lang="es-UY" sz="1100" dirty="0">
                         <a:effectLst/>
                         <a:latin typeface="Times New Roman" panose="02020603050405020304" pitchFamily="18" charset="0"/>
                         <a:ea typeface="Times New Roman" panose="02020603050405020304" pitchFamily="18" charset="0"/>
@@ -7607,12 +7727,12 @@
           <a:lstStyle/>
           <a:p>
             <a:r>
-              <a:rPr lang="es-ES" dirty="0" smtClean="0">
+              <a:rPr lang="es-UY" dirty="0" smtClean="0">
                 <a:effectLst/>
                 <a:latin typeface="Times New Roman" panose="02020603050405020304" pitchFamily="18" charset="0"/>
                 <a:ea typeface="Times New Roman" panose="02020603050405020304" pitchFamily="18" charset="0"/>
               </a:rPr>
-              <a:t>Representaremos el porcentaje de mejora a través de la siguiente tabla, se toma como base el algoritmo de urgencia con capacidades.</a:t>
+              <a:t>Representaremos el porcentaje de mejora de los algoritmos implementados a través de la siguiente tabla, se toma como base el algoritmo de urgencia con capacidades.</a:t>
             </a:r>
             <a:endParaRPr lang="es-UY" dirty="0"/>
           </a:p>
@@ -7621,13 +7741,20 @@
     </p:spTree>
     <p:extLst>
       <p:ext uri="{BB962C8B-B14F-4D97-AF65-F5344CB8AC3E}">
-        <p14:creationId xmlns:p14="http://schemas.microsoft.com/office/powerpoint/2010/main" val="3089067586"/>
+        <p14:creationId xmlns:p14="http://schemas.microsoft.com/office/powerpoint/2010/main" val="3046759313"/>
       </p:ext>
     </p:extLst>
   </p:cSld>
   <p:clrMapOvr>
     <a:masterClrMapping/>
   </p:clrMapOvr>
+  <p:timing>
+    <p:tnLst>
+      <p:par>
+        <p:cTn id="1" dur="indefinite" restart="never" nodeType="tmRoot"/>
+      </p:par>
+    </p:tnLst>
+  </p:timing>
 </p:sld>
 </file>
 
@@ -7664,35 +7791,23 @@
           <a:lstStyle/>
           <a:p>
             <a:r>
-              <a:rPr lang="en-US" dirty="0" err="1" smtClean="0"/>
+              <a:rPr lang="es-UY" dirty="0" err="1"/>
               <a:t>MDVRP</a:t>
             </a:r>
             <a:r>
-              <a:rPr lang="en-US" dirty="0" smtClean="0"/>
-              <a:t>- </a:t>
-            </a:r>
-            <a:r>
-              <a:rPr lang="en-US" dirty="0" err="1" smtClean="0"/>
-              <a:t>Solucion</a:t>
-            </a:r>
-            <a:r>
-              <a:rPr lang="en-US" dirty="0" smtClean="0"/>
-              <a:t>, </a:t>
-            </a:r>
-            <a:r>
-              <a:rPr lang="en-US" dirty="0" err="1" smtClean="0"/>
-              <a:t>Testeo</a:t>
-            </a:r>
-            <a:r>
-              <a:rPr lang="en-US" dirty="0" smtClean="0"/>
-              <a:t>.</a:t>
+              <a:rPr lang="es-UY" dirty="0"/>
+              <a:t>- Solución, Testeo.</a:t>
             </a:r>
             <a:br>
-              <a:rPr lang="en-US" dirty="0" smtClean="0"/>
+              <a:rPr lang="es-UY" dirty="0"/>
             </a:br>
             <a:r>
-              <a:rPr lang="en-US" dirty="0" err="1" smtClean="0"/>
-              <a:t>Conclusiones</a:t>
+              <a:rPr lang="es-UY" dirty="0"/>
+              <a:t>Análisis de </a:t>
+            </a:r>
+            <a:r>
+              <a:rPr lang="es-UY" dirty="0" smtClean="0"/>
+              <a:t>Resultados</a:t>
             </a:r>
             <a:endParaRPr lang="es-UY" dirty="0"/>
           </a:p>
@@ -7710,19 +7825,72 @@
         </p:nvSpPr>
         <p:spPr/>
         <p:txBody>
-          <a:bodyPr/>
+          <a:bodyPr>
+            <a:normAutofit fontScale="77500" lnSpcReduction="20000"/>
+          </a:bodyPr>
           <a:lstStyle/>
           <a:p>
             <a:r>
-              <a:rPr lang="es-UY" dirty="0">
-                <a:solidFill>
-                  <a:schemeClr val="accent1">
-                    <a:lumMod val="50000"/>
-                  </a:schemeClr>
-                </a:solidFill>
-              </a:rPr>
-              <a:t>Fran</a:t>
-            </a:r>
+              <a:rPr lang="es-ES" dirty="0"/>
+              <a:t>El costo del caso A es mayor que el resultado de </a:t>
+            </a:r>
+            <a:r>
+              <a:rPr lang="es-ES" dirty="0" err="1"/>
+              <a:t>TSPLib</a:t>
+            </a:r>
+            <a:r>
+              <a:rPr lang="es-ES" dirty="0"/>
+              <a:t> para el algoritmo de asignación básico, pero recordemos que </a:t>
+            </a:r>
+            <a:r>
+              <a:rPr lang="es-ES" dirty="0" err="1"/>
+              <a:t>TSPLib</a:t>
+            </a:r>
+            <a:r>
+              <a:rPr lang="es-ES" dirty="0"/>
+              <a:t> no considera las capacidades, y las mismas fueron agregadas. </a:t>
+            </a:r>
+          </a:p>
+          <a:p>
+            <a:r>
+              <a:rPr lang="es-ES" dirty="0"/>
+              <a:t>El </a:t>
+            </a:r>
+            <a:r>
+              <a:rPr lang="es-ES" dirty="0" err="1"/>
+              <a:t>AER</a:t>
+            </a:r>
+            <a:r>
+              <a:rPr lang="es-ES" dirty="0"/>
+              <a:t> corrió en un tiempo relativamente corto y mejoro la solución respecto a los métodos de asignación por urgencia. </a:t>
+            </a:r>
+          </a:p>
+          <a:p>
+            <a:r>
+              <a:rPr lang="es-ES" dirty="0"/>
+              <a:t>El algoritmo de asignación Enajenados Lento (con intercambio entre depósitos) demoro un tiempo considerable pero llego a una solución mejor que todas las otras formas de asignación implementadas.</a:t>
+            </a:r>
+          </a:p>
+          <a:p>
+            <a:r>
+              <a:rPr lang="es-ES" dirty="0"/>
+              <a:t>El problema de la mejora de los clientes enajenados produjo mejores rutas en todos los casos que se probaron.</a:t>
+            </a:r>
+          </a:p>
+          <a:p>
+            <a:r>
+              <a:rPr lang="es-ES" dirty="0"/>
+              <a:t>El algoritmo de Ruteo finalizo  su  ejecución en pocos segundos, y los algoritmos de post optimización, al ser locales para cada deposito también fueron ejecutados en segundos.</a:t>
+            </a:r>
+          </a:p>
+          <a:p>
+            <a:r>
+              <a:rPr lang="es-ES" dirty="0"/>
+              <a:t> Los algoritmos de post optimización produciendo siempre mejoras en los casos con muchos clientes.</a:t>
+            </a:r>
+            <a:endParaRPr lang="es-UY" dirty="0"/>
+          </a:p>
+          <a:p>
             <a:endParaRPr lang="es-UY" dirty="0"/>
           </a:p>
         </p:txBody>
@@ -7730,7 +7898,7 @@
     </p:spTree>
     <p:extLst>
       <p:ext uri="{BB962C8B-B14F-4D97-AF65-F5344CB8AC3E}">
-        <p14:creationId xmlns:p14="http://schemas.microsoft.com/office/powerpoint/2010/main" val="2516212354"/>
+        <p14:creationId xmlns:p14="http://schemas.microsoft.com/office/powerpoint/2010/main" val="3364224153"/>
       </p:ext>
     </p:extLst>
   </p:cSld>
@@ -7773,47 +7941,16 @@
           <a:lstStyle/>
           <a:p>
             <a:r>
-              <a:rPr lang="en-US" dirty="0" err="1" smtClean="0"/>
+              <a:rPr lang="es-UY" dirty="0" err="1" smtClean="0"/>
               <a:t>MDVRP</a:t>
             </a:r>
             <a:r>
-              <a:rPr lang="en-US" dirty="0" smtClean="0"/>
-              <a:t>- </a:t>
-            </a:r>
-            <a:r>
-              <a:rPr lang="en-US" dirty="0" err="1" smtClean="0"/>
-              <a:t>Solucion</a:t>
-            </a:r>
-            <a:r>
-              <a:rPr lang="en-US" dirty="0" smtClean="0"/>
-              <a:t>, </a:t>
-            </a:r>
-            <a:r>
-              <a:rPr lang="en-US" dirty="0" err="1" smtClean="0"/>
-              <a:t>Testeo</a:t>
-            </a:r>
-            <a:r>
-              <a:rPr lang="en-US" dirty="0" smtClean="0"/>
-              <a:t>.</a:t>
-            </a:r>
-            <a:br>
-              <a:rPr lang="en-US" dirty="0" smtClean="0"/>
-            </a:br>
-            <a:r>
-              <a:rPr lang="en-US" dirty="0" err="1" smtClean="0"/>
-              <a:t>Trabajo</a:t>
-            </a:r>
-            <a:r>
-              <a:rPr lang="en-US" dirty="0" smtClean="0"/>
-              <a:t>  a </a:t>
-            </a:r>
-            <a:r>
-              <a:rPr lang="en-US" dirty="0" err="1" smtClean="0"/>
-              <a:t>Futuro</a:t>
-            </a:r>
-            <a:r>
-              <a:rPr lang="en-US" dirty="0" smtClean="0"/>
-              <a:t>.</a:t>
+              <a:rPr lang="es-UY" dirty="0"/>
+              <a:t> </a:t>
+            </a:r>
+            <a:r>
+              <a:rPr lang="es-UY" dirty="0" smtClean="0"/>
+              <a:t>Conclusiones</a:t>
             </a:r>
             <a:endParaRPr lang="es-UY" dirty="0"/>
           </a:p>
@@ -7831,20 +7968,260 @@
         </p:nvSpPr>
         <p:spPr/>
         <p:txBody>
+          <a:bodyPr>
+            <a:normAutofit fontScale="92500" lnSpcReduction="10000"/>
+          </a:bodyPr>
+          <a:lstStyle/>
+          <a:p>
+            <a:r>
+              <a:rPr lang="es-ES" dirty="0"/>
+              <a:t>La implementación y mejoras de algoritmos de solución de </a:t>
+            </a:r>
+            <a:r>
+              <a:rPr lang="es-ES" dirty="0" err="1"/>
+              <a:t>MDVRP</a:t>
+            </a:r>
+            <a:r>
+              <a:rPr lang="es-ES" dirty="0"/>
+              <a:t>, es un problema abierto y de continuo crecimiento, donde todos los meses se pueden encontrar nuevas publicaciones académicas con algoritmos y mejoras. </a:t>
+            </a:r>
+            <a:endParaRPr lang="es-ES" dirty="0" smtClean="0"/>
+          </a:p>
+          <a:p>
+            <a:r>
+              <a:rPr lang="es-ES" dirty="0" smtClean="0"/>
+              <a:t>A través de este Proyecto de Grado se brinda </a:t>
+            </a:r>
+            <a:r>
+              <a:rPr lang="es-ES" dirty="0"/>
+              <a:t>una solución informática para la implementación de nuevos algoritmos y de esta forma proveer un ambiente amigable para ejecutar, </a:t>
+            </a:r>
+            <a:r>
+              <a:rPr lang="es-ES" dirty="0" smtClean="0"/>
+              <a:t>parametrización y validación de algoritmos de </a:t>
+            </a:r>
+            <a:r>
+              <a:rPr lang="es-ES" dirty="0"/>
+              <a:t>resolución del problema de </a:t>
+            </a:r>
+            <a:r>
+              <a:rPr lang="es-ES" dirty="0" err="1"/>
+              <a:t>MDVRP</a:t>
+            </a:r>
+            <a:r>
+              <a:rPr lang="es-ES" dirty="0" smtClean="0"/>
+              <a:t>. Así como permitir la comparación de ejecuciones.</a:t>
+            </a:r>
+          </a:p>
+          <a:p>
+            <a:r>
+              <a:rPr lang="es-ES" dirty="0" smtClean="0"/>
+              <a:t>Por otro lado se detecto, analizo y se trabajo en algoritmos para un problema particular en la asignación. Los clientes enajenados en la etapa de asignación.</a:t>
+            </a:r>
+          </a:p>
+          <a:p>
+            <a:pPr marL="0" indent="0">
+              <a:buNone/>
+            </a:pPr>
+            <a:endParaRPr lang="es-UY" dirty="0"/>
+          </a:p>
+          <a:p>
+            <a:endParaRPr lang="es-UY" dirty="0"/>
+          </a:p>
+        </p:txBody>
+      </p:sp>
+    </p:spTree>
+    <p:extLst>
+      <p:ext uri="{BB962C8B-B14F-4D97-AF65-F5344CB8AC3E}">
+        <p14:creationId xmlns:p14="http://schemas.microsoft.com/office/powerpoint/2010/main" val="2516212354"/>
+      </p:ext>
+    </p:extLst>
+  </p:cSld>
+  <p:clrMapOvr>
+    <a:masterClrMapping/>
+  </p:clrMapOvr>
+  <p:timing>
+    <p:tnLst>
+      <p:par>
+        <p:cTn id="1" dur="indefinite" restart="never" nodeType="tmRoot"/>
+      </p:par>
+    </p:tnLst>
+  </p:timing>
+</p:sld>
+</file>
+
+<file path=ppt/slides/slide23.xml><?xml version="1.0" encoding="utf-8"?>
+<p:sld xmlns:a="http://schemas.openxmlformats.org/drawingml/2006/main" xmlns:r="http://schemas.openxmlformats.org/officeDocument/2006/relationships" xmlns:p="http://schemas.openxmlformats.org/presentationml/2006/main">
+  <p:cSld>
+    <p:spTree>
+      <p:nvGrpSpPr>
+        <p:cNvPr id="1" name=""/>
+        <p:cNvGrpSpPr/>
+        <p:nvPr/>
+      </p:nvGrpSpPr>
+      <p:grpSpPr>
+        <a:xfrm>
+          <a:off x="0" y="0"/>
+          <a:ext cx="0" cy="0"/>
+          <a:chOff x="0" y="0"/>
+          <a:chExt cx="0" cy="0"/>
+        </a:xfrm>
+      </p:grpSpPr>
+      <p:sp>
+        <p:nvSpPr>
+          <p:cNvPr id="2" name="Title 1"/>
+          <p:cNvSpPr>
+            <a:spLocks noGrp="1"/>
+          </p:cNvSpPr>
+          <p:nvPr>
+            <p:ph type="title"/>
+          </p:nvPr>
+        </p:nvSpPr>
+        <p:spPr/>
+        <p:txBody>
           <a:bodyPr/>
           <a:lstStyle/>
           <a:p>
             <a:r>
-              <a:rPr lang="es-UY" dirty="0">
-                <a:solidFill>
-                  <a:schemeClr val="accent1">
-                    <a:lumMod val="50000"/>
-                  </a:schemeClr>
-                </a:solidFill>
-              </a:rPr>
-              <a:t>Fran</a:t>
+              <a:rPr lang="es-UY" dirty="0" err="1" smtClean="0"/>
+              <a:t>MDVRP</a:t>
+            </a:r>
+            <a:r>
+              <a:rPr lang="es-UY" dirty="0" smtClean="0"/>
+              <a:t>- Solución, Testeo.</a:t>
+            </a:r>
+            <a:br>
+              <a:rPr lang="es-UY" dirty="0" smtClean="0"/>
+            </a:br>
+            <a:r>
+              <a:rPr lang="es-UY" dirty="0" smtClean="0"/>
+              <a:t>Trabajo  a Futuro.</a:t>
             </a:r>
             <a:endParaRPr lang="es-UY" dirty="0"/>
+          </a:p>
+        </p:txBody>
+      </p:sp>
+      <p:sp>
+        <p:nvSpPr>
+          <p:cNvPr id="3" name="Content Placeholder 2"/>
+          <p:cNvSpPr>
+            <a:spLocks noGrp="1"/>
+          </p:cNvSpPr>
+          <p:nvPr>
+            <p:ph idx="1"/>
+          </p:nvPr>
+        </p:nvSpPr>
+        <p:spPr/>
+        <p:txBody>
+          <a:bodyPr>
+            <a:normAutofit fontScale="92500" lnSpcReduction="10000"/>
+          </a:bodyPr>
+          <a:lstStyle/>
+          <a:p>
+            <a:r>
+              <a:rPr lang="es-ES" dirty="0" smtClean="0"/>
+              <a:t>Algunos posibles trabajos a futuro que fueron detectados.</a:t>
+            </a:r>
+          </a:p>
+          <a:p>
+            <a:r>
+              <a:rPr lang="es-ES" dirty="0" smtClean="0"/>
+              <a:t>A Nivel de la aplicación</a:t>
+            </a:r>
+          </a:p>
+          <a:p>
+            <a:pPr lvl="1"/>
+            <a:r>
+              <a:rPr lang="es-ES" dirty="0" smtClean="0"/>
+              <a:t>El proyecto se enfoco en </a:t>
+            </a:r>
+            <a:r>
+              <a:rPr lang="es-ES" dirty="0" err="1" smtClean="0"/>
+              <a:t>MDVRP</a:t>
+            </a:r>
+            <a:r>
+              <a:rPr lang="es-ES" dirty="0" smtClean="0"/>
+              <a:t> con capacidades siendo necesario efectuar ciertas modificaciones para otras variantes de </a:t>
+            </a:r>
+            <a:r>
+              <a:rPr lang="es-ES" dirty="0" err="1" smtClean="0"/>
+              <a:t>MDVRP</a:t>
+            </a:r>
+            <a:r>
+              <a:rPr lang="es-ES" dirty="0" smtClean="0"/>
+              <a:t> (con ventanas de tiempo, periodicidad, flota heterogénea).</a:t>
+            </a:r>
+          </a:p>
+          <a:p>
+            <a:pPr lvl="1"/>
+            <a:r>
+              <a:rPr lang="es-ES" dirty="0" smtClean="0"/>
+              <a:t>Utilización de coordenadas geográficas para otros problemas de </a:t>
+            </a:r>
+            <a:r>
+              <a:rPr lang="es-ES" dirty="0" err="1" smtClean="0"/>
+              <a:t>MDVRP</a:t>
+            </a:r>
+            <a:r>
+              <a:rPr lang="es-ES" dirty="0" smtClean="0"/>
+              <a:t>. Permitiendo nuevos formatos de entrada que no sean los del standard de </a:t>
+            </a:r>
+            <a:r>
+              <a:rPr lang="es-ES" dirty="0" err="1" smtClean="0"/>
+              <a:t>TSPLIB</a:t>
+            </a:r>
+            <a:r>
+              <a:rPr lang="es-ES" dirty="0" smtClean="0"/>
+              <a:t>.</a:t>
+            </a:r>
+          </a:p>
+          <a:p>
+            <a:r>
+              <a:rPr lang="es-ES" dirty="0" smtClean="0"/>
+              <a:t>Algoritmo</a:t>
+            </a:r>
+          </a:p>
+          <a:p>
+            <a:pPr lvl="1"/>
+            <a:r>
+              <a:rPr lang="es-ES" dirty="0" smtClean="0"/>
+              <a:t>El problema de enajenados es uno de los problemas detectados y pueden existir otras particularidades en los clientes cuyo análisis incida en mejores rutas.</a:t>
+            </a:r>
+          </a:p>
+          <a:p>
+            <a:pPr lvl="1"/>
+            <a:r>
+              <a:rPr lang="es-ES" dirty="0" smtClean="0"/>
+              <a:t>Profundizar en la retroalimentación entre etapas para encontrar mejores rutas (En nuestra implementación, </a:t>
+            </a:r>
+            <a:r>
+              <a:rPr lang="es-ES" dirty="0" err="1" smtClean="0"/>
+              <a:t>unicamente</a:t>
+            </a:r>
+            <a:r>
+              <a:rPr lang="es-ES" dirty="0" smtClean="0"/>
+              <a:t> </a:t>
+            </a:r>
+            <a:r>
+              <a:rPr lang="es-ES" dirty="0" err="1" smtClean="0"/>
+              <a:t>AEL</a:t>
+            </a:r>
+            <a:r>
+              <a:rPr lang="es-ES" dirty="0" smtClean="0"/>
+              <a:t> utiliza un algoritmo de ruteo para evaluar la mejora en cada iteración). </a:t>
+            </a:r>
+          </a:p>
+          <a:p>
+            <a:endParaRPr lang="es-ES" dirty="0"/>
+          </a:p>
+          <a:p>
+            <a:endParaRPr lang="es-ES" dirty="0" smtClean="0"/>
+          </a:p>
+          <a:p>
+            <a:endParaRPr lang="es-ES" dirty="0"/>
+          </a:p>
+          <a:p>
+            <a:endParaRPr lang="es-ES" dirty="0" smtClean="0"/>
           </a:p>
         </p:txBody>
       </p:sp>
@@ -8183,34 +8560,14 @@
         </p:spPr>
         <p:txBody>
           <a:bodyPr>
-            <a:normAutofit fontScale="92500" lnSpcReduction="10000"/>
+            <a:normAutofit fontScale="85000" lnSpcReduction="20000"/>
           </a:bodyPr>
           <a:lstStyle/>
           <a:p>
             <a:r>
-              <a:rPr lang="es-ES" b="1" dirty="0"/>
-              <a:t>Definición del </a:t>
-            </a:r>
-            <a:r>
               <a:rPr lang="es-ES" b="1" dirty="0" smtClean="0"/>
-              <a:t>problema</a:t>
-            </a:r>
-          </a:p>
-          <a:p>
-            <a:pPr lvl="1"/>
-            <a:r>
-              <a:rPr lang="es-ES" b="1" dirty="0" smtClean="0"/>
-              <a:t>Que es lo que queremos realizar y con que </a:t>
-            </a:r>
-            <a:r>
-              <a:rPr lang="es-ES" b="1" dirty="0" err="1" smtClean="0"/>
-              <a:t>proposito</a:t>
-            </a:r>
-            <a:r>
-              <a:rPr lang="es-ES" b="1" dirty="0" smtClean="0"/>
-              <a:t>?</a:t>
-            </a:r>
-            <a:endParaRPr lang="es-UY" b="1" dirty="0" smtClean="0"/>
+              <a:t>Objetivo del Proyecto. </a:t>
+            </a:r>
           </a:p>
           <a:p>
             <a:pPr lvl="1"/>
@@ -8220,91 +8577,194 @@
             </a:r>
             <a:r>
               <a:rPr lang="es-ES" dirty="0"/>
-              <a:t>aplicación y algoritmos que solucionen el problema a partir de la información analizada en la etapa de investigación. Finalmente se sugirió crear distintas algoritmos que permitan mejorar la solución. </a:t>
+              <a:t>aplicación y </a:t>
+            </a:r>
+            <a:r>
+              <a:rPr lang="es-ES" dirty="0" smtClean="0"/>
+              <a:t>algoritmos </a:t>
+            </a:r>
+            <a:r>
+              <a:rPr lang="es-ES" dirty="0"/>
+              <a:t>que solucionen el problema </a:t>
+            </a:r>
+            <a:r>
+              <a:rPr lang="es-ES" dirty="0" smtClean="0"/>
+              <a:t>de </a:t>
+            </a:r>
+            <a:r>
+              <a:rPr lang="es-ES" dirty="0" err="1" smtClean="0"/>
+              <a:t>MDVRP</a:t>
+            </a:r>
+            <a:r>
+              <a:rPr lang="es-ES" dirty="0" smtClean="0"/>
+              <a:t> a </a:t>
+            </a:r>
+            <a:r>
+              <a:rPr lang="es-ES" dirty="0"/>
+              <a:t>partir de la información analizada en la etapa de investigación. </a:t>
+            </a:r>
+            <a:endParaRPr lang="es-ES" dirty="0" smtClean="0"/>
+          </a:p>
+          <a:p>
+            <a:pPr lvl="1"/>
+            <a:r>
+              <a:rPr lang="es-ES" dirty="0" smtClean="0"/>
+              <a:t>Crear </a:t>
+            </a:r>
+            <a:r>
+              <a:rPr lang="es-ES" dirty="0"/>
+              <a:t>distintas algoritmos que permitan mejorar la </a:t>
+            </a:r>
+            <a:r>
+              <a:rPr lang="es-ES" dirty="0" smtClean="0"/>
+              <a:t>solución.</a:t>
             </a:r>
             <a:endParaRPr lang="en-US" dirty="0" smtClean="0"/>
           </a:p>
           <a:p>
             <a:r>
-              <a:rPr lang="en-US" dirty="0" err="1" smtClean="0"/>
-              <a:t>Aplicacion</a:t>
-            </a:r>
-            <a:r>
               <a:rPr lang="en-US" dirty="0" smtClean="0"/>
-              <a:t> y </a:t>
-            </a:r>
-            <a:r>
-              <a:rPr lang="en-US" dirty="0" err="1" smtClean="0"/>
-              <a:t>caracteristicas</a:t>
+              <a:t>Characteristics </a:t>
+            </a:r>
+            <a:r>
+              <a:rPr lang="es-UY" dirty="0" smtClean="0"/>
+              <a:t>deseadas</a:t>
             </a:r>
             <a:r>
               <a:rPr lang="en-US" dirty="0" smtClean="0"/>
+              <a:t> en el </a:t>
+            </a:r>
+            <a:r>
+              <a:rPr lang="es-UY" dirty="0" smtClean="0"/>
+              <a:t>programa:</a:t>
+            </a:r>
+            <a:endParaRPr lang="en-US" dirty="0" smtClean="0"/>
+          </a:p>
+          <a:p>
+            <a:pPr lvl="1"/>
+            <a:r>
+              <a:rPr lang="es-ES" dirty="0" smtClean="0"/>
+              <a:t>Compatibilidad de datos de entrada con los formatos de </a:t>
+            </a:r>
+            <a:r>
+              <a:rPr lang="es-ES" dirty="0" err="1" smtClean="0"/>
+              <a:t>TSPLib</a:t>
+            </a:r>
+            <a:r>
+              <a:rPr lang="es-ES" dirty="0" smtClean="0"/>
+              <a:t>.</a:t>
+            </a:r>
+            <a:endParaRPr lang="en-US" dirty="0" smtClean="0"/>
+          </a:p>
+          <a:p>
+            <a:pPr lvl="1"/>
+            <a:r>
+              <a:rPr lang="es-UY" dirty="0" smtClean="0"/>
+              <a:t>Permitir agregar </a:t>
+            </a:r>
+            <a:r>
+              <a:rPr lang="es-UY" dirty="0"/>
+              <a:t>o </a:t>
+            </a:r>
+            <a:r>
+              <a:rPr lang="es-UY" dirty="0" smtClean="0"/>
+              <a:t>modificar implementación de algoritmos</a:t>
+            </a:r>
+            <a:r>
+              <a:rPr lang="es-UY" dirty="0"/>
               <a:t> </a:t>
             </a:r>
             <a:r>
-              <a:rPr lang="en-US" dirty="0" err="1" smtClean="0"/>
-              <a:t>deseadas</a:t>
-            </a:r>
-            <a:r>
-              <a:rPr lang="en-US" dirty="0" smtClean="0"/>
-              <a:t>…</a:t>
-            </a:r>
+              <a:rPr lang="es-UY" dirty="0" smtClean="0"/>
+              <a:t>de solución de </a:t>
+            </a:r>
+            <a:r>
+              <a:rPr lang="es-UY" dirty="0" err="1" smtClean="0"/>
+              <a:t>MDVRP</a:t>
+            </a:r>
+            <a:r>
+              <a:rPr lang="es-UY" dirty="0" smtClean="0"/>
+              <a:t>.</a:t>
+            </a:r>
+            <a:endParaRPr lang="en-US" dirty="0" smtClean="0"/>
           </a:p>
           <a:p>
             <a:pPr lvl="1"/>
             <a:r>
-              <a:rPr lang="en-US" dirty="0" smtClean="0"/>
-              <a:t>1</a:t>
-            </a:r>
+              <a:rPr lang="es-UY" dirty="0"/>
+              <a:t>Los algoritmos y soluciones deben ser parametrizables permitiendo restringir el número de iteraciones, tiempo de corrida o rango de mejoras</a:t>
+            </a:r>
+            <a:r>
+              <a:rPr lang="es-UY" dirty="0" smtClean="0"/>
+              <a:t>.</a:t>
+            </a:r>
+            <a:endParaRPr lang="en-US" dirty="0" smtClean="0"/>
           </a:p>
           <a:p>
             <a:pPr lvl="1"/>
             <a:r>
-              <a:rPr lang="en-US" dirty="0" smtClean="0"/>
-              <a:t>2</a:t>
+              <a:rPr lang="es-UY" dirty="0"/>
+              <a:t>Se debe manejar una holgura en los depósitos que permita cierta flexibilidad en la capacidad máxima del depósito (oferta del depósito</a:t>
+            </a:r>
+            <a:r>
+              <a:rPr lang="es-UY" dirty="0" smtClean="0"/>
+              <a:t>).</a:t>
             </a:r>
           </a:p>
           <a:p>
             <a:pPr lvl="1"/>
             <a:r>
-              <a:rPr lang="en-US" dirty="0" smtClean="0"/>
-              <a:t>3</a:t>
-            </a:r>
+              <a:rPr lang="es-ES" dirty="0"/>
+              <a:t>E</a:t>
+            </a:r>
+            <a:r>
+              <a:rPr lang="es-ES" dirty="0" smtClean="0"/>
+              <a:t>ntorno grafico</a:t>
+            </a:r>
+          </a:p>
+          <a:p>
+            <a:pPr lvl="2"/>
+            <a:r>
+              <a:rPr lang="es-ES" dirty="0" smtClean="0"/>
+              <a:t>Resultado: la </a:t>
+            </a:r>
+            <a:r>
+              <a:rPr lang="es-ES" dirty="0"/>
+              <a:t>visualización de los clientes, depósitos y rutas luego de ejecutar un </a:t>
+            </a:r>
+            <a:r>
+              <a:rPr lang="es-ES" dirty="0" smtClean="0"/>
+              <a:t>algoritmo</a:t>
+            </a:r>
+          </a:p>
+          <a:p>
+            <a:pPr lvl="2"/>
+            <a:r>
+              <a:rPr lang="es-ES" dirty="0" smtClean="0"/>
+              <a:t>Zonificación: Delimitar las zonas de cada deposito.</a:t>
+            </a:r>
+          </a:p>
+          <a:p>
+            <a:pPr lvl="2"/>
+            <a:r>
+              <a:rPr lang="es-ES" dirty="0" smtClean="0"/>
+              <a:t>Visibilidad: Resaltar objetos y permitir zoom.</a:t>
+            </a:r>
+            <a:endParaRPr lang="en-US" dirty="0" smtClean="0"/>
           </a:p>
           <a:p>
             <a:pPr lvl="1"/>
             <a:r>
-              <a:rPr lang="en-US" dirty="0" smtClean="0"/>
-              <a:t>4</a:t>
-            </a:r>
-          </a:p>
-          <a:p>
-            <a:pPr lvl="1"/>
-            <a:r>
-              <a:rPr lang="en-US" dirty="0" smtClean="0"/>
-              <a:t>5</a:t>
-            </a:r>
-          </a:p>
-          <a:p>
-            <a:pPr lvl="1"/>
-            <a:r>
-              <a:rPr lang="en-US" dirty="0" err="1" smtClean="0"/>
-              <a:t>Etc</a:t>
-            </a:r>
-            <a:r>
-              <a:rPr lang="en-US" dirty="0" smtClean="0"/>
-              <a:t> </a:t>
-            </a:r>
-            <a:r>
-              <a:rPr lang="en-US" dirty="0" smtClean="0">
-                <a:solidFill>
-                  <a:schemeClr val="accent1">
-                    <a:lumMod val="50000"/>
-                  </a:schemeClr>
-                </a:solidFill>
-              </a:rPr>
-              <a:t>Fran</a:t>
-            </a:r>
+              <a:rPr lang="es-UY" dirty="0" smtClean="0"/>
+              <a:t>Permitir ver los cambios en cada iteración para analizar el algoritmo.</a:t>
+            </a:r>
+            <a:endParaRPr lang="es-UY" dirty="0" smtClean="0">
+              <a:solidFill>
+                <a:schemeClr val="accent1">
+                  <a:lumMod val="50000"/>
+                </a:schemeClr>
+              </a:solidFill>
+            </a:endParaRPr>
           </a:p>
         </p:txBody>
       </p:sp>
@@ -8318,6 +8778,13 @@
   <p:clrMapOvr>
     <a:masterClrMapping/>
   </p:clrMapOvr>
+  <p:timing>
+    <p:tnLst>
+      <p:par>
+        <p:cTn id="1" dur="indefinite" restart="never" nodeType="tmRoot"/>
+      </p:par>
+    </p:tnLst>
+  </p:timing>
 </p:sld>
 </file>
 
@@ -8396,28 +8863,55 @@
             <p:ph idx="1"/>
           </p:nvPr>
         </p:nvSpPr>
-        <p:spPr/>
+        <p:spPr>
+          <a:xfrm>
+            <a:off x="838200" y="1825625"/>
+            <a:ext cx="10515600" cy="3210609"/>
+          </a:xfrm>
+        </p:spPr>
         <p:txBody>
           <a:bodyPr>
-            <a:normAutofit fontScale="92500"/>
+            <a:normAutofit lnSpcReduction="10000"/>
           </a:bodyPr>
           <a:lstStyle/>
           <a:p>
             <a:r>
               <a:rPr lang="es-ES" dirty="0" smtClean="0"/>
-              <a:t>Analizando </a:t>
+              <a:t>La solución del problema de </a:t>
+            </a:r>
+            <a:r>
+              <a:rPr lang="es-ES" dirty="0" err="1" smtClean="0"/>
+              <a:t>MDVRP</a:t>
+            </a:r>
+            <a:r>
+              <a:rPr lang="es-ES" dirty="0" smtClean="0"/>
+              <a:t> se </a:t>
             </a:r>
             <a:r>
               <a:rPr lang="es-ES" dirty="0"/>
-              <a:t>el problema con los tutores y basado principalmente en las </a:t>
+              <a:t>baso en </a:t>
             </a:r>
             <a:r>
               <a:rPr lang="es-ES" dirty="0" smtClean="0"/>
-              <a:t>heurísticas </a:t>
+              <a:t>una heurísticas </a:t>
             </a:r>
             <a:r>
               <a:rPr lang="es-ES" dirty="0"/>
-              <a:t>de dos fases para la  </a:t>
+              <a:t>de dos </a:t>
+            </a:r>
+            <a:r>
+              <a:rPr lang="es-ES" dirty="0" smtClean="0"/>
+              <a:t>fases, una etapa de asignación o zonificación y una etapa de ruteo.</a:t>
+            </a:r>
+          </a:p>
+          <a:p>
+            <a:r>
+              <a:rPr lang="es-ES" dirty="0" smtClean="0"/>
+              <a:t>Basados en las publicaciones, se identificaron 4 </a:t>
+            </a:r>
+            <a:r>
+              <a:rPr lang="es-ES" dirty="0"/>
+              <a:t>posibles etapas en la </a:t>
             </a:r>
             <a:r>
               <a:rPr lang="es-ES" dirty="0" smtClean="0"/>
@@ -8425,22 +8919,6 @@
             </a:r>
             <a:r>
               <a:rPr lang="es-ES" dirty="0"/>
-              <a:t>de </a:t>
-            </a:r>
-            <a:r>
-              <a:rPr lang="es-ES" dirty="0" err="1"/>
-              <a:t>MDVRP</a:t>
-            </a:r>
-            <a:r>
-              <a:rPr lang="es-ES" dirty="0"/>
-              <a:t> se llegó a identificar 4 posibles etapas en la </a:t>
-            </a:r>
-            <a:r>
-              <a:rPr lang="es-ES" dirty="0" smtClean="0"/>
-              <a:t>resolución </a:t>
-            </a:r>
-            <a:r>
-              <a:rPr lang="es-ES" dirty="0"/>
               <a:t>de este tipo de problemas: Asignación, Mejora de la asignación, Ruteo, </a:t>
             </a:r>
             <a:r>
@@ -8451,105 +8929,9 @@
           <a:p>
             <a:r>
               <a:rPr lang="es-ES" dirty="0" smtClean="0"/>
-              <a:t>En estas 4 etapas se puede realimentar a una etapa anterior o usar información para mejorar. (explicar con ejemplos … </a:t>
-            </a:r>
-            <a:r>
-              <a:rPr lang="es-ES" dirty="0" err="1" smtClean="0"/>
-              <a:t>AEL</a:t>
-            </a:r>
-            <a:r>
-              <a:rPr lang="es-ES" dirty="0" smtClean="0"/>
-              <a:t>).</a:t>
+              <a:t>En la etapa de mejora de asignación se puede ejecutar algoritmos para estimar la menor ruta posible en base a algoritmos de ruteo. </a:t>
             </a:r>
             <a:endParaRPr lang="es-UY" dirty="0" smtClean="0"/>
-          </a:p>
-          <a:p>
-            <a:pPr marL="0" indent="0">
-              <a:buNone/>
-            </a:pPr>
-            <a:endParaRPr lang="es-UY" dirty="0" smtClean="0"/>
-          </a:p>
-          <a:p>
-            <a:r>
-              <a:rPr lang="en-US" dirty="0" err="1" smtClean="0"/>
-              <a:t>Dibujo</a:t>
-            </a:r>
-            <a:r>
-              <a:rPr lang="en-US" dirty="0" smtClean="0"/>
-              <a:t> …. </a:t>
-            </a:r>
-            <a:r>
-              <a:rPr lang="en-US" dirty="0" err="1" smtClean="0"/>
-              <a:t>Algo</a:t>
-            </a:r>
-            <a:r>
-              <a:rPr lang="en-US" dirty="0" smtClean="0"/>
-              <a:t> </a:t>
-            </a:r>
-            <a:r>
-              <a:rPr lang="en-US" dirty="0" err="1" smtClean="0"/>
-              <a:t>asi</a:t>
-            </a:r>
-            <a:r>
-              <a:rPr lang="en-US" dirty="0" smtClean="0"/>
-              <a:t> </a:t>
-            </a:r>
-          </a:p>
-          <a:p>
-            <a:pPr marL="0" indent="0">
-              <a:buNone/>
-            </a:pPr>
-            <a:r>
-              <a:rPr lang="en-US" dirty="0" err="1" smtClean="0"/>
-              <a:t>pero</a:t>
-            </a:r>
-            <a:r>
-              <a:rPr lang="en-US" dirty="0" smtClean="0"/>
-              <a:t> con las 4 </a:t>
-            </a:r>
-            <a:r>
-              <a:rPr lang="en-US" dirty="0" err="1" smtClean="0"/>
-              <a:t>etapas</a:t>
-            </a:r>
-            <a:r>
-              <a:rPr lang="en-US" dirty="0" smtClean="0"/>
-              <a:t>.</a:t>
-            </a:r>
-          </a:p>
-          <a:p>
-            <a:pPr marL="0" indent="0">
-              <a:buNone/>
-            </a:pPr>
-            <a:r>
-              <a:rPr lang="en-US" dirty="0" smtClean="0"/>
-              <a:t>… </a:t>
-            </a:r>
-            <a:r>
-              <a:rPr lang="en-US" dirty="0" err="1" smtClean="0"/>
-              <a:t>flujo</a:t>
-            </a:r>
-            <a:r>
-              <a:rPr lang="en-US" dirty="0" smtClean="0"/>
-              <a:t> y </a:t>
-            </a:r>
-            <a:r>
-              <a:rPr lang="en-US" dirty="0" err="1" smtClean="0"/>
-              <a:t>eso</a:t>
-            </a:r>
-            <a:r>
-              <a:rPr lang="en-US" dirty="0" smtClean="0"/>
-              <a:t> … </a:t>
-            </a:r>
-            <a:r>
-              <a:rPr lang="en-US" dirty="0" smtClean="0">
-                <a:solidFill>
-                  <a:schemeClr val="accent1">
-                    <a:lumMod val="50000"/>
-                  </a:schemeClr>
-                </a:solidFill>
-              </a:rPr>
-              <a:t>Fran</a:t>
-            </a:r>
           </a:p>
           <a:p>
             <a:pPr marL="0" indent="0">
@@ -8564,20 +8946,22 @@
       </p:sp>
       <p:pic>
         <p:nvPicPr>
-          <p:cNvPr id="5" name="Imagen 35"/>
-          <p:cNvPicPr/>
+          <p:cNvPr id="7" name="Picture 6"/>
+          <p:cNvPicPr>
+            <a:picLocks noChangeAspect="1"/>
+          </p:cNvPicPr>
           <p:nvPr/>
         </p:nvPicPr>
         <p:blipFill>
-          <a:blip r:embed="rId2" cstate="print"/>
+          <a:blip r:embed="rId2"/>
           <a:stretch>
             <a:fillRect/>
           </a:stretch>
         </p:blipFill>
         <p:spPr>
           <a:xfrm>
-            <a:off x="4216184" y="4477846"/>
-            <a:ext cx="7137615" cy="2064622"/>
+            <a:off x="1169931" y="5200253"/>
+            <a:ext cx="9852137" cy="1657747"/>
           </a:xfrm>
           <a:prstGeom prst="rect">
             <a:avLst/>
@@ -8594,6 +8978,13 @@
   <p:clrMapOvr>
     <a:masterClrMapping/>
   </p:clrMapOvr>
+  <p:timing>
+    <p:tnLst>
+      <p:par>
+        <p:cTn id="1" dur="indefinite" restart="never" nodeType="tmRoot"/>
+      </p:par>
+    </p:tnLst>
+  </p:timing>
 </p:sld>
 </file>
 
@@ -8896,7 +9287,7 @@
                         <m:sSubPr>
                           <m:ctrlPr>
                             <a:rPr lang="es-UY" i="1">
-                              <a:latin typeface="Cambria Math"/>
+                              <a:latin typeface="Cambria Math" panose="02040503050406030204" pitchFamily="18" charset="0"/>
                             </a:rPr>
                           </m:ctrlPr>
                         </m:sSubPr>
@@ -8927,7 +9318,7 @@
                         <m:dPr>
                           <m:ctrlPr>
                             <a:rPr lang="es-UY" i="1">
-                              <a:latin typeface="Cambria Math"/>
+                              <a:latin typeface="Cambria Math" panose="02040503050406030204" pitchFamily="18" charset="0"/>
                             </a:rPr>
                           </m:ctrlPr>
                         </m:dPr>
@@ -8939,7 +9330,7 @@
                               <m:supHide m:val="on"/>
                               <m:ctrlPr>
                                 <a:rPr lang="es-UY" i="1">
-                                  <a:latin typeface="Cambria Math"/>
+                                  <a:latin typeface="Cambria Math" panose="02040503050406030204" pitchFamily="18" charset="0"/>
                                 </a:rPr>
                               </m:ctrlPr>
                             </m:naryPr>
@@ -8987,7 +9378,7 @@
                                 <m:dPr>
                                   <m:ctrlPr>
                                     <a:rPr lang="es-UY" i="1">
-                                      <a:latin typeface="Cambria Math"/>
+                                      <a:latin typeface="Cambria Math" panose="02040503050406030204" pitchFamily="18" charset="0"/>
                                     </a:rPr>
                                   </m:ctrlPr>
                                 </m:dPr>
@@ -9032,7 +9423,7 @@
                         <m:dPr>
                           <m:ctrlPr>
                             <a:rPr lang="es-UY" i="1">
-                              <a:latin typeface="Cambria Math"/>
+                              <a:latin typeface="Cambria Math" panose="02040503050406030204" pitchFamily="18" charset="0"/>
                             </a:rPr>
                           </m:ctrlPr>
                         </m:dPr>
@@ -9088,7 +9479,7 @@
                       <m:dPr>
                         <m:ctrlPr>
                           <a:rPr lang="es-UY" sz="2000" i="1">
-                            <a:latin typeface="Cambria Math"/>
+                            <a:latin typeface="Cambria Math" panose="02040503050406030204" pitchFamily="18" charset="0"/>
                           </a:rPr>
                         </m:ctrlPr>
                       </m:dPr>
@@ -9173,7 +9564,7 @@
                       <m:dPr>
                         <m:ctrlPr>
                           <a:rPr lang="es-UY" sz="2000" i="1">
-                            <a:latin typeface="Cambria Math"/>
+                            <a:latin typeface="Cambria Math" panose="02040503050406030204" pitchFamily="18" charset="0"/>
                           </a:rPr>
                         </m:ctrlPr>
                       </m:dPr>
@@ -9256,7 +9647,7 @@
                       <m:sSubPr>
                         <m:ctrlPr>
                           <a:rPr lang="es-UY" sz="2000" i="1">
-                            <a:latin typeface="Cambria Math"/>
+                            <a:latin typeface="Cambria Math" panose="02040503050406030204" pitchFamily="18" charset="0"/>
                           </a:rPr>
                         </m:ctrlPr>
                       </m:sSubPr>
@@ -9300,7 +9691,7 @@
                       <m:sSubPr>
                         <m:ctrlPr>
                           <a:rPr lang="es-UY" i="1">
-                            <a:latin typeface="Cambria Math"/>
+                            <a:latin typeface="Cambria Math" panose="02040503050406030204" pitchFamily="18" charset="0"/>
                           </a:rPr>
                         </m:ctrlPr>
                       </m:sSubPr>
@@ -9843,7 +10234,7 @@
   <a:extraClrSchemeLst/>
   <a:extLst>
     <a:ext uri="{05A4C25C-085E-4340-85A3-A5531E510DB2}">
-      <thm15:themeFamily xmlns:thm15="http://schemas.microsoft.com/office/thememl/2012/main" xmlns="" name="Office Theme" id="{62F939B6-93AF-4DB8-9C6B-D6C7DFDC589F}" vid="{4A3C46E8-61CC-4603-A589-7422A47A8E4A}"/>
+      <thm15:themeFamily xmlns:thm15="http://schemas.microsoft.com/office/thememl/2012/main" name="Office Theme" id="{62F939B6-93AF-4DB8-9C6B-D6C7DFDC589F}" vid="{4A3C46E8-61CC-4603-A589-7422A47A8E4A}"/>
     </a:ext>
   </a:extLst>
 </a:theme>

</xml_diff>